<commit_message>
update presentations to new slide design
</commit_message>
<xml_diff>
--- a/presentations/Presentation_2_RSR-Overview.pptx
+++ b/presentations/Presentation_2_RSR-Overview.pptx
@@ -15,7 +15,6 @@
     <p:sldId id="259" r:id="rId8"/>
     <p:sldId id="260" r:id="rId9"/>
     <p:sldId id="261" r:id="rId10"/>
-    <p:sldId id="262" r:id="rId11"/>
   </p:sldIdLst>
   <p:sldSz cx="9144000" cy="6858000"/>
   <p:notesSz cx="6858000" cy="9144000"/>
@@ -41,7 +40,7 @@
       </p:grpSpPr>
       <p:sp>
         <p:nvSpPr>
-          <p:cNvPr id="86" name="PlaceHolder 1"/>
+          <p:cNvPr id="78" name="PlaceHolder 1"/>
           <p:cNvSpPr>
             <a:spLocks noGrp="1"/>
           </p:cNvSpPr>
@@ -78,7 +77,7 @@
       </p:sp>
       <p:sp>
         <p:nvSpPr>
-          <p:cNvPr id="87" name="PlaceHolder 2"/>
+          <p:cNvPr id="79" name="PlaceHolder 2"/>
           <p:cNvSpPr>
             <a:spLocks noGrp="1"/>
           </p:cNvSpPr>
@@ -114,7 +113,7 @@
       </p:sp>
       <p:sp>
         <p:nvSpPr>
-          <p:cNvPr id="88" name="PlaceHolder 3"/>
+          <p:cNvPr id="80" name="PlaceHolder 3"/>
           <p:cNvSpPr>
             <a:spLocks noGrp="1"/>
           </p:cNvSpPr>
@@ -150,7 +149,7 @@
       </p:sp>
       <p:sp>
         <p:nvSpPr>
-          <p:cNvPr id="89" name="PlaceHolder 4"/>
+          <p:cNvPr id="81" name="PlaceHolder 4"/>
           <p:cNvSpPr>
             <a:spLocks noGrp="1"/>
           </p:cNvSpPr>
@@ -187,7 +186,7 @@
       </p:sp>
       <p:sp>
         <p:nvSpPr>
-          <p:cNvPr id="90" name="PlaceHolder 5"/>
+          <p:cNvPr id="82" name="PlaceHolder 5"/>
           <p:cNvSpPr>
             <a:spLocks noGrp="1"/>
           </p:cNvSpPr>
@@ -223,7 +222,7 @@
       </p:sp>
       <p:sp>
         <p:nvSpPr>
-          <p:cNvPr id="91" name="PlaceHolder 6"/>
+          <p:cNvPr id="83" name="PlaceHolder 6"/>
           <p:cNvSpPr>
             <a:spLocks noGrp="1"/>
           </p:cNvSpPr>
@@ -246,7 +245,7 @@
           </a:bodyPr>
           <a:p>
             <a:pPr algn="r"/>
-            <a:fld id="{E995830D-4E98-4694-812F-FB27A0544EA2}" type="slidenum">
+            <a:fld id="{A481B3F6-7D09-44A6-9ACD-DBE69BA38B66}" type="slidenum">
               <a:rPr b="0" lang="en-GB" sz="1400" spc="-1" strike="noStrike">
                 <a:latin typeface="Times New Roman"/>
               </a:rPr>
@@ -283,7 +282,7 @@
       </p:grpSpPr>
       <p:sp>
         <p:nvSpPr>
-          <p:cNvPr id="126" name="PlaceHolder 1"/>
+          <p:cNvPr id="113" name="PlaceHolder 1"/>
           <p:cNvSpPr>
             <a:spLocks noGrp="1"/>
           </p:cNvSpPr>
@@ -294,16 +293,16 @@
         <p:spPr>
           <a:xfrm>
             <a:off x="1143000" y="685800"/>
-            <a:ext cx="4570920" cy="3427920"/>
-          </a:xfrm>
-          <a:prstGeom prst="rect">
-            <a:avLst/>
-          </a:prstGeom>
-        </p:spPr>
-      </p:sp>
-      <p:sp>
-        <p:nvSpPr>
-          <p:cNvPr id="127" name="PlaceHolder 2"/>
+            <a:ext cx="4569840" cy="3426840"/>
+          </a:xfrm>
+          <a:prstGeom prst="rect">
+            <a:avLst/>
+          </a:prstGeom>
+        </p:spPr>
+      </p:sp>
+      <p:sp>
+        <p:nvSpPr>
+          <p:cNvPr id="114" name="PlaceHolder 2"/>
           <p:cNvSpPr>
             <a:spLocks noGrp="1"/>
           </p:cNvSpPr>
@@ -314,7 +313,7 @@
         <p:spPr>
           <a:xfrm>
             <a:off x="685800" y="4343400"/>
-            <a:ext cx="5485320" cy="4113720"/>
+            <a:ext cx="5484240" cy="4112640"/>
           </a:xfrm>
           <a:prstGeom prst="rect">
             <a:avLst/>
@@ -325,7 +324,7 @@
             <a:noAutofit/>
           </a:bodyPr>
           <a:p>
-            <a:pPr marL="216000" indent="-215280">
+            <a:pPr marL="216000" indent="-214200">
               <a:lnSpc>
                 <a:spcPct val="100000"/>
               </a:lnSpc>
@@ -347,14 +346,14 @@
       </p:sp>
       <p:sp>
         <p:nvSpPr>
-          <p:cNvPr id="128" name="CustomShape 3"/>
+          <p:cNvPr id="115" name="CustomShape 3"/>
           <p:cNvSpPr/>
           <p:nvPr/>
         </p:nvSpPr>
         <p:spPr>
           <a:xfrm>
             <a:off x="3884760" y="8685360"/>
-            <a:ext cx="2970720" cy="456120"/>
+            <a:ext cx="2969640" cy="455040"/>
           </a:xfrm>
           <a:prstGeom prst="rect">
             <a:avLst/>
@@ -380,7 +379,7 @@
                 <a:spcPct val="100000"/>
               </a:lnSpc>
             </a:pPr>
-            <a:fld id="{723112D6-E304-4A49-9DA5-4DAED74C0D4F}" type="slidenum">
+            <a:fld id="{7F4FB55D-DC17-42CD-B832-FABBD1516BD1}" type="slidenum">
               <a:rPr b="0" lang="de-DE" sz="1200" spc="-1" strike="noStrike">
                 <a:solidFill>
                   <a:srgbClr val="000000"/>
@@ -391,6 +390,9 @@
               <a:t>&lt;number&gt;</a:t>
             </a:fld>
             <a:endParaRPr b="0" lang="en-GB" sz="1200" spc="-1" strike="noStrike">
+              <a:solidFill>
+                <a:srgbClr val="b2b2b2"/>
+              </a:solidFill>
               <a:latin typeface="Arial"/>
             </a:endParaRPr>
           </a:p>
@@ -420,7 +422,7 @@
       </p:grpSpPr>
       <p:sp>
         <p:nvSpPr>
-          <p:cNvPr id="129" name="PlaceHolder 1"/>
+          <p:cNvPr id="116" name="PlaceHolder 1"/>
           <p:cNvSpPr>
             <a:spLocks noGrp="1"/>
           </p:cNvSpPr>
@@ -431,16 +433,16 @@
         <p:spPr>
           <a:xfrm>
             <a:off x="1143000" y="685800"/>
-            <a:ext cx="4570920" cy="3427920"/>
-          </a:xfrm>
-          <a:prstGeom prst="rect">
-            <a:avLst/>
-          </a:prstGeom>
-        </p:spPr>
-      </p:sp>
-      <p:sp>
-        <p:nvSpPr>
-          <p:cNvPr id="130" name="PlaceHolder 2"/>
+            <a:ext cx="4569840" cy="3426840"/>
+          </a:xfrm>
+          <a:prstGeom prst="rect">
+            <a:avLst/>
+          </a:prstGeom>
+        </p:spPr>
+      </p:sp>
+      <p:sp>
+        <p:nvSpPr>
+          <p:cNvPr id="117" name="PlaceHolder 2"/>
           <p:cNvSpPr>
             <a:spLocks noGrp="1"/>
           </p:cNvSpPr>
@@ -451,7 +453,7 @@
         <p:spPr>
           <a:xfrm>
             <a:off x="685800" y="4343400"/>
-            <a:ext cx="5485320" cy="4113720"/>
+            <a:ext cx="5484240" cy="4112640"/>
           </a:xfrm>
           <a:prstGeom prst="rect">
             <a:avLst/>
@@ -462,7 +464,7 @@
             <a:noAutofit/>
           </a:bodyPr>
           <a:p>
-            <a:pPr marL="171360" indent="-170280">
+            <a:pPr marL="171360" indent="-169200">
               <a:lnSpc>
                 <a:spcPct val="100000"/>
               </a:lnSpc>
@@ -483,7 +485,7 @@
             </a:endParaRPr>
           </a:p>
           <a:p>
-            <a:pPr marL="171360" indent="-170280">
+            <a:pPr marL="171360" indent="-169200">
               <a:lnSpc>
                 <a:spcPct val="100000"/>
               </a:lnSpc>
@@ -504,7 +506,7 @@
             </a:endParaRPr>
           </a:p>
           <a:p>
-            <a:pPr marL="171360" indent="-170280">
+            <a:pPr marL="171360" indent="-169200">
               <a:lnSpc>
                 <a:spcPct val="100000"/>
               </a:lnSpc>
@@ -525,7 +527,7 @@
             </a:endParaRPr>
           </a:p>
           <a:p>
-            <a:pPr marL="171360" indent="-170280">
+            <a:pPr marL="171360" indent="-169200">
               <a:lnSpc>
                 <a:spcPct val="100000"/>
               </a:lnSpc>
@@ -546,7 +548,7 @@
             </a:endParaRPr>
           </a:p>
           <a:p>
-            <a:pPr marL="171360" indent="-170280">
+            <a:pPr marL="171360" indent="-169200">
               <a:lnSpc>
                 <a:spcPct val="100000"/>
               </a:lnSpc>
@@ -567,7 +569,7 @@
             </a:endParaRPr>
           </a:p>
           <a:p>
-            <a:pPr marL="171360" indent="-170280">
+            <a:pPr marL="171360" indent="-169200">
               <a:lnSpc>
                 <a:spcPct val="100000"/>
               </a:lnSpc>
@@ -591,14 +593,14 @@
       </p:sp>
       <p:sp>
         <p:nvSpPr>
-          <p:cNvPr id="131" name="CustomShape 3"/>
+          <p:cNvPr id="118" name="CustomShape 3"/>
           <p:cNvSpPr/>
           <p:nvPr/>
         </p:nvSpPr>
         <p:spPr>
           <a:xfrm>
             <a:off x="3884760" y="8685360"/>
-            <a:ext cx="2970720" cy="456120"/>
+            <a:ext cx="2969640" cy="455040"/>
           </a:xfrm>
           <a:prstGeom prst="rect">
             <a:avLst/>
@@ -624,7 +626,7 @@
                 <a:spcPct val="100000"/>
               </a:lnSpc>
             </a:pPr>
-            <a:fld id="{59A6E45F-7CB0-4254-8BF9-645B0826A313}" type="slidenum">
+            <a:fld id="{68C3B1A2-969A-47A0-ABC4-832E9AB5F338}" type="slidenum">
               <a:rPr b="0" lang="de-DE" sz="1200" spc="-1" strike="noStrike">
                 <a:solidFill>
                   <a:srgbClr val="000000"/>
@@ -634,6 +636,9 @@
               <a:t>&lt;number&gt;</a:t>
             </a:fld>
             <a:endParaRPr b="0" lang="en-GB" sz="1200" spc="-1" strike="noStrike">
+              <a:solidFill>
+                <a:srgbClr val="b2b2b2"/>
+              </a:solidFill>
               <a:latin typeface="Arial"/>
             </a:endParaRPr>
           </a:p>
@@ -663,7 +668,7 @@
       </p:grpSpPr>
       <p:sp>
         <p:nvSpPr>
-          <p:cNvPr id="132" name="PlaceHolder 1"/>
+          <p:cNvPr id="119" name="PlaceHolder 1"/>
           <p:cNvSpPr>
             <a:spLocks noGrp="1"/>
           </p:cNvSpPr>
@@ -674,16 +679,16 @@
         <p:spPr>
           <a:xfrm>
             <a:off x="1143000" y="685800"/>
-            <a:ext cx="4570920" cy="3427920"/>
-          </a:xfrm>
-          <a:prstGeom prst="rect">
-            <a:avLst/>
-          </a:prstGeom>
-        </p:spPr>
-      </p:sp>
-      <p:sp>
-        <p:nvSpPr>
-          <p:cNvPr id="133" name="PlaceHolder 2"/>
+            <a:ext cx="4569840" cy="3426840"/>
+          </a:xfrm>
+          <a:prstGeom prst="rect">
+            <a:avLst/>
+          </a:prstGeom>
+        </p:spPr>
+      </p:sp>
+      <p:sp>
+        <p:nvSpPr>
+          <p:cNvPr id="120" name="PlaceHolder 2"/>
           <p:cNvSpPr>
             <a:spLocks noGrp="1"/>
           </p:cNvSpPr>
@@ -694,7 +699,7 @@
         <p:spPr>
           <a:xfrm>
             <a:off x="685800" y="4343400"/>
-            <a:ext cx="5485320" cy="4113720"/>
+            <a:ext cx="5484240" cy="4112640"/>
           </a:xfrm>
           <a:prstGeom prst="rect">
             <a:avLst/>
@@ -705,7 +710,7 @@
             <a:noAutofit/>
           </a:bodyPr>
           <a:p>
-            <a:pPr marL="171360" indent="-170280">
+            <a:pPr marL="171360" indent="-169200">
               <a:lnSpc>
                 <a:spcPct val="100000"/>
               </a:lnSpc>
@@ -726,7 +731,7 @@
             </a:endParaRPr>
           </a:p>
           <a:p>
-            <a:pPr marL="171360" indent="-170280">
+            <a:pPr marL="171360" indent="-169200">
               <a:lnSpc>
                 <a:spcPct val="100000"/>
               </a:lnSpc>
@@ -747,7 +752,7 @@
             </a:endParaRPr>
           </a:p>
           <a:p>
-            <a:pPr marL="171360" indent="-170280">
+            <a:pPr marL="171360" indent="-169200">
               <a:lnSpc>
                 <a:spcPct val="100000"/>
               </a:lnSpc>
@@ -768,7 +773,7 @@
             </a:endParaRPr>
           </a:p>
           <a:p>
-            <a:pPr marL="171360" indent="-170280">
+            <a:pPr marL="171360" indent="-169200">
               <a:lnSpc>
                 <a:spcPct val="100000"/>
               </a:lnSpc>
@@ -789,7 +794,7 @@
             </a:endParaRPr>
           </a:p>
           <a:p>
-            <a:pPr marL="171360" indent="-170280">
+            <a:pPr marL="171360" indent="-169200">
               <a:lnSpc>
                 <a:spcPct val="100000"/>
               </a:lnSpc>
@@ -810,7 +815,7 @@
             </a:endParaRPr>
           </a:p>
           <a:p>
-            <a:pPr marL="171360" indent="-170280">
+            <a:pPr marL="171360" indent="-169200">
               <a:lnSpc>
                 <a:spcPct val="100000"/>
               </a:lnSpc>
@@ -834,14 +839,14 @@
       </p:sp>
       <p:sp>
         <p:nvSpPr>
-          <p:cNvPr id="134" name="CustomShape 3"/>
+          <p:cNvPr id="121" name="CustomShape 3"/>
           <p:cNvSpPr/>
           <p:nvPr/>
         </p:nvSpPr>
         <p:spPr>
           <a:xfrm>
             <a:off x="3884760" y="8685360"/>
-            <a:ext cx="2970720" cy="456120"/>
+            <a:ext cx="2969640" cy="455040"/>
           </a:xfrm>
           <a:prstGeom prst="rect">
             <a:avLst/>
@@ -867,7 +872,7 @@
                 <a:spcPct val="100000"/>
               </a:lnSpc>
             </a:pPr>
-            <a:fld id="{83FC9DC2-F044-4594-BFB0-71359DB0C4C3}" type="slidenum">
+            <a:fld id="{906E22BB-1A97-48AC-A517-9692198982B7}" type="slidenum">
               <a:rPr b="0" lang="de-DE" sz="1200" spc="-1" strike="noStrike">
                 <a:solidFill>
                   <a:srgbClr val="000000"/>
@@ -877,6 +882,9 @@
               <a:t>&lt;number&gt;</a:t>
             </a:fld>
             <a:endParaRPr b="0" lang="en-GB" sz="1200" spc="-1" strike="noStrike">
+              <a:solidFill>
+                <a:srgbClr val="b2b2b2"/>
+              </a:solidFill>
               <a:latin typeface="Arial"/>
             </a:endParaRPr>
           </a:p>
@@ -928,7 +936,7 @@
       </p:grpSpPr>
       <p:sp>
         <p:nvSpPr>
-          <p:cNvPr id="30" name="PlaceHolder 1"/>
+          <p:cNvPr id="24" name="PlaceHolder 1"/>
           <p:cNvSpPr>
             <a:spLocks noGrp="1"/>
           </p:cNvSpPr>
@@ -959,7 +967,7 @@
       </p:sp>
       <p:sp>
         <p:nvSpPr>
-          <p:cNvPr id="31" name="PlaceHolder 2"/>
+          <p:cNvPr id="25" name="PlaceHolder 2"/>
           <p:cNvSpPr>
             <a:spLocks noGrp="1"/>
           </p:cNvSpPr>
@@ -989,7 +997,7 @@
       </p:sp>
       <p:sp>
         <p:nvSpPr>
-          <p:cNvPr id="32" name="PlaceHolder 3"/>
+          <p:cNvPr id="26" name="PlaceHolder 3"/>
           <p:cNvSpPr>
             <a:spLocks noGrp="1"/>
           </p:cNvSpPr>
@@ -1041,7 +1049,7 @@
       </p:grpSpPr>
       <p:sp>
         <p:nvSpPr>
-          <p:cNvPr id="33" name="PlaceHolder 1"/>
+          <p:cNvPr id="27" name="PlaceHolder 1"/>
           <p:cNvSpPr>
             <a:spLocks noGrp="1"/>
           </p:cNvSpPr>
@@ -1072,7 +1080,7 @@
       </p:sp>
       <p:sp>
         <p:nvSpPr>
-          <p:cNvPr id="34" name="PlaceHolder 2"/>
+          <p:cNvPr id="28" name="PlaceHolder 2"/>
           <p:cNvSpPr>
             <a:spLocks noGrp="1"/>
           </p:cNvSpPr>
@@ -1102,7 +1110,7 @@
       </p:sp>
       <p:sp>
         <p:nvSpPr>
-          <p:cNvPr id="35" name="PlaceHolder 3"/>
+          <p:cNvPr id="29" name="PlaceHolder 3"/>
           <p:cNvSpPr>
             <a:spLocks noGrp="1"/>
           </p:cNvSpPr>
@@ -1132,7 +1140,7 @@
       </p:sp>
       <p:sp>
         <p:nvSpPr>
-          <p:cNvPr id="36" name="PlaceHolder 4"/>
+          <p:cNvPr id="30" name="PlaceHolder 4"/>
           <p:cNvSpPr>
             <a:spLocks noGrp="1"/>
           </p:cNvSpPr>
@@ -1162,7 +1170,7 @@
       </p:sp>
       <p:sp>
         <p:nvSpPr>
-          <p:cNvPr id="37" name="PlaceHolder 5"/>
+          <p:cNvPr id="31" name="PlaceHolder 5"/>
           <p:cNvSpPr>
             <a:spLocks noGrp="1"/>
           </p:cNvSpPr>
@@ -1214,7 +1222,7 @@
       </p:grpSpPr>
       <p:sp>
         <p:nvSpPr>
-          <p:cNvPr id="38" name="PlaceHolder 1"/>
+          <p:cNvPr id="32" name="PlaceHolder 1"/>
           <p:cNvSpPr>
             <a:spLocks noGrp="1"/>
           </p:cNvSpPr>
@@ -1245,7 +1253,7 @@
       </p:sp>
       <p:sp>
         <p:nvSpPr>
-          <p:cNvPr id="39" name="PlaceHolder 2"/>
+          <p:cNvPr id="33" name="PlaceHolder 2"/>
           <p:cNvSpPr>
             <a:spLocks noGrp="1"/>
           </p:cNvSpPr>
@@ -1275,7 +1283,7 @@
       </p:sp>
       <p:sp>
         <p:nvSpPr>
-          <p:cNvPr id="40" name="PlaceHolder 3"/>
+          <p:cNvPr id="34" name="PlaceHolder 3"/>
           <p:cNvSpPr>
             <a:spLocks noGrp="1"/>
           </p:cNvSpPr>
@@ -1305,7 +1313,7 @@
       </p:sp>
       <p:sp>
         <p:nvSpPr>
-          <p:cNvPr id="41" name="PlaceHolder 4"/>
+          <p:cNvPr id="35" name="PlaceHolder 4"/>
           <p:cNvSpPr>
             <a:spLocks noGrp="1"/>
           </p:cNvSpPr>
@@ -1335,7 +1343,7 @@
       </p:sp>
       <p:sp>
         <p:nvSpPr>
-          <p:cNvPr id="42" name="PlaceHolder 5"/>
+          <p:cNvPr id="36" name="PlaceHolder 5"/>
           <p:cNvSpPr>
             <a:spLocks noGrp="1"/>
           </p:cNvSpPr>
@@ -1365,7 +1373,7 @@
       </p:sp>
       <p:sp>
         <p:nvSpPr>
-          <p:cNvPr id="43" name="PlaceHolder 6"/>
+          <p:cNvPr id="37" name="PlaceHolder 6"/>
           <p:cNvSpPr>
             <a:spLocks noGrp="1"/>
           </p:cNvSpPr>
@@ -1395,7 +1403,7 @@
       </p:sp>
       <p:sp>
         <p:nvSpPr>
-          <p:cNvPr id="44" name="PlaceHolder 7"/>
+          <p:cNvPr id="38" name="PlaceHolder 7"/>
           <p:cNvSpPr>
             <a:spLocks noGrp="1"/>
           </p:cNvSpPr>
@@ -1469,7 +1477,7 @@
       </p:grpSpPr>
       <p:sp>
         <p:nvSpPr>
-          <p:cNvPr id="50" name="PlaceHolder 1"/>
+          <p:cNvPr id="42" name="PlaceHolder 1"/>
           <p:cNvSpPr>
             <a:spLocks noGrp="1"/>
           </p:cNvSpPr>
@@ -1500,7 +1508,7 @@
       </p:sp>
       <p:sp>
         <p:nvSpPr>
-          <p:cNvPr id="51" name="PlaceHolder 2"/>
+          <p:cNvPr id="43" name="PlaceHolder 2"/>
           <p:cNvSpPr>
             <a:spLocks noGrp="1"/>
           </p:cNvSpPr>
@@ -1553,7 +1561,7 @@
       </p:grpSpPr>
       <p:sp>
         <p:nvSpPr>
-          <p:cNvPr id="52" name="PlaceHolder 1"/>
+          <p:cNvPr id="44" name="PlaceHolder 1"/>
           <p:cNvSpPr>
             <a:spLocks noGrp="1"/>
           </p:cNvSpPr>
@@ -1584,7 +1592,7 @@
       </p:sp>
       <p:sp>
         <p:nvSpPr>
-          <p:cNvPr id="53" name="PlaceHolder 2"/>
+          <p:cNvPr id="45" name="PlaceHolder 2"/>
           <p:cNvSpPr>
             <a:spLocks noGrp="1"/>
           </p:cNvSpPr>
@@ -1636,7 +1644,7 @@
       </p:grpSpPr>
       <p:sp>
         <p:nvSpPr>
-          <p:cNvPr id="54" name="PlaceHolder 1"/>
+          <p:cNvPr id="46" name="PlaceHolder 1"/>
           <p:cNvSpPr>
             <a:spLocks noGrp="1"/>
           </p:cNvSpPr>
@@ -1667,7 +1675,7 @@
       </p:sp>
       <p:sp>
         <p:nvSpPr>
-          <p:cNvPr id="55" name="PlaceHolder 2"/>
+          <p:cNvPr id="47" name="PlaceHolder 2"/>
           <p:cNvSpPr>
             <a:spLocks noGrp="1"/>
           </p:cNvSpPr>
@@ -1697,7 +1705,7 @@
       </p:sp>
       <p:sp>
         <p:nvSpPr>
-          <p:cNvPr id="56" name="PlaceHolder 3"/>
+          <p:cNvPr id="48" name="PlaceHolder 3"/>
           <p:cNvSpPr>
             <a:spLocks noGrp="1"/>
           </p:cNvSpPr>
@@ -1749,7 +1757,7 @@
       </p:grpSpPr>
       <p:sp>
         <p:nvSpPr>
-          <p:cNvPr id="57" name="PlaceHolder 1"/>
+          <p:cNvPr id="49" name="PlaceHolder 1"/>
           <p:cNvSpPr>
             <a:spLocks noGrp="1"/>
           </p:cNvSpPr>
@@ -1802,7 +1810,7 @@
       </p:grpSpPr>
       <p:sp>
         <p:nvSpPr>
-          <p:cNvPr id="58" name="PlaceHolder 1"/>
+          <p:cNvPr id="50" name="PlaceHolder 1"/>
           <p:cNvSpPr>
             <a:spLocks noGrp="1"/>
           </p:cNvSpPr>
@@ -1855,7 +1863,7 @@
       </p:grpSpPr>
       <p:sp>
         <p:nvSpPr>
-          <p:cNvPr id="59" name="PlaceHolder 1"/>
+          <p:cNvPr id="51" name="PlaceHolder 1"/>
           <p:cNvSpPr>
             <a:spLocks noGrp="1"/>
           </p:cNvSpPr>
@@ -1886,7 +1894,7 @@
       </p:sp>
       <p:sp>
         <p:nvSpPr>
-          <p:cNvPr id="60" name="PlaceHolder 2"/>
+          <p:cNvPr id="52" name="PlaceHolder 2"/>
           <p:cNvSpPr>
             <a:spLocks noGrp="1"/>
           </p:cNvSpPr>
@@ -1916,7 +1924,7 @@
       </p:sp>
       <p:sp>
         <p:nvSpPr>
-          <p:cNvPr id="61" name="PlaceHolder 3"/>
+          <p:cNvPr id="53" name="PlaceHolder 3"/>
           <p:cNvSpPr>
             <a:spLocks noGrp="1"/>
           </p:cNvSpPr>
@@ -1946,7 +1954,7 @@
       </p:sp>
       <p:sp>
         <p:nvSpPr>
-          <p:cNvPr id="62" name="PlaceHolder 4"/>
+          <p:cNvPr id="54" name="PlaceHolder 4"/>
           <p:cNvSpPr>
             <a:spLocks noGrp="1"/>
           </p:cNvSpPr>
@@ -1998,7 +2006,7 @@
       </p:grpSpPr>
       <p:sp>
         <p:nvSpPr>
-          <p:cNvPr id="9" name="PlaceHolder 1"/>
+          <p:cNvPr id="3" name="PlaceHolder 1"/>
           <p:cNvSpPr>
             <a:spLocks noGrp="1"/>
           </p:cNvSpPr>
@@ -2029,7 +2037,7 @@
       </p:sp>
       <p:sp>
         <p:nvSpPr>
-          <p:cNvPr id="10" name="PlaceHolder 2"/>
+          <p:cNvPr id="4" name="PlaceHolder 2"/>
           <p:cNvSpPr>
             <a:spLocks noGrp="1"/>
           </p:cNvSpPr>
@@ -2082,7 +2090,7 @@
       </p:grpSpPr>
       <p:sp>
         <p:nvSpPr>
-          <p:cNvPr id="63" name="PlaceHolder 1"/>
+          <p:cNvPr id="55" name="PlaceHolder 1"/>
           <p:cNvSpPr>
             <a:spLocks noGrp="1"/>
           </p:cNvSpPr>
@@ -2113,7 +2121,7 @@
       </p:sp>
       <p:sp>
         <p:nvSpPr>
-          <p:cNvPr id="64" name="PlaceHolder 2"/>
+          <p:cNvPr id="56" name="PlaceHolder 2"/>
           <p:cNvSpPr>
             <a:spLocks noGrp="1"/>
           </p:cNvSpPr>
@@ -2143,7 +2151,7 @@
       </p:sp>
       <p:sp>
         <p:nvSpPr>
-          <p:cNvPr id="65" name="PlaceHolder 3"/>
+          <p:cNvPr id="57" name="PlaceHolder 3"/>
           <p:cNvSpPr>
             <a:spLocks noGrp="1"/>
           </p:cNvSpPr>
@@ -2173,7 +2181,7 @@
       </p:sp>
       <p:sp>
         <p:nvSpPr>
-          <p:cNvPr id="66" name="PlaceHolder 4"/>
+          <p:cNvPr id="58" name="PlaceHolder 4"/>
           <p:cNvSpPr>
             <a:spLocks noGrp="1"/>
           </p:cNvSpPr>
@@ -2225,7 +2233,7 @@
       </p:grpSpPr>
       <p:sp>
         <p:nvSpPr>
-          <p:cNvPr id="67" name="PlaceHolder 1"/>
+          <p:cNvPr id="59" name="PlaceHolder 1"/>
           <p:cNvSpPr>
             <a:spLocks noGrp="1"/>
           </p:cNvSpPr>
@@ -2256,7 +2264,7 @@
       </p:sp>
       <p:sp>
         <p:nvSpPr>
-          <p:cNvPr id="68" name="PlaceHolder 2"/>
+          <p:cNvPr id="60" name="PlaceHolder 2"/>
           <p:cNvSpPr>
             <a:spLocks noGrp="1"/>
           </p:cNvSpPr>
@@ -2286,7 +2294,7 @@
       </p:sp>
       <p:sp>
         <p:nvSpPr>
-          <p:cNvPr id="69" name="PlaceHolder 3"/>
+          <p:cNvPr id="61" name="PlaceHolder 3"/>
           <p:cNvSpPr>
             <a:spLocks noGrp="1"/>
           </p:cNvSpPr>
@@ -2316,7 +2324,7 @@
       </p:sp>
       <p:sp>
         <p:nvSpPr>
-          <p:cNvPr id="70" name="PlaceHolder 4"/>
+          <p:cNvPr id="62" name="PlaceHolder 4"/>
           <p:cNvSpPr>
             <a:spLocks noGrp="1"/>
           </p:cNvSpPr>
@@ -2368,7 +2376,7 @@
       </p:grpSpPr>
       <p:sp>
         <p:nvSpPr>
-          <p:cNvPr id="71" name="PlaceHolder 1"/>
+          <p:cNvPr id="63" name="PlaceHolder 1"/>
           <p:cNvSpPr>
             <a:spLocks noGrp="1"/>
           </p:cNvSpPr>
@@ -2399,7 +2407,7 @@
       </p:sp>
       <p:sp>
         <p:nvSpPr>
-          <p:cNvPr id="72" name="PlaceHolder 2"/>
+          <p:cNvPr id="64" name="PlaceHolder 2"/>
           <p:cNvSpPr>
             <a:spLocks noGrp="1"/>
           </p:cNvSpPr>
@@ -2429,7 +2437,7 @@
       </p:sp>
       <p:sp>
         <p:nvSpPr>
-          <p:cNvPr id="73" name="PlaceHolder 3"/>
+          <p:cNvPr id="65" name="PlaceHolder 3"/>
           <p:cNvSpPr>
             <a:spLocks noGrp="1"/>
           </p:cNvSpPr>
@@ -2481,7 +2489,7 @@
       </p:grpSpPr>
       <p:sp>
         <p:nvSpPr>
-          <p:cNvPr id="74" name="PlaceHolder 1"/>
+          <p:cNvPr id="66" name="PlaceHolder 1"/>
           <p:cNvSpPr>
             <a:spLocks noGrp="1"/>
           </p:cNvSpPr>
@@ -2512,7 +2520,7 @@
       </p:sp>
       <p:sp>
         <p:nvSpPr>
-          <p:cNvPr id="75" name="PlaceHolder 2"/>
+          <p:cNvPr id="67" name="PlaceHolder 2"/>
           <p:cNvSpPr>
             <a:spLocks noGrp="1"/>
           </p:cNvSpPr>
@@ -2542,7 +2550,7 @@
       </p:sp>
       <p:sp>
         <p:nvSpPr>
-          <p:cNvPr id="76" name="PlaceHolder 3"/>
+          <p:cNvPr id="68" name="PlaceHolder 3"/>
           <p:cNvSpPr>
             <a:spLocks noGrp="1"/>
           </p:cNvSpPr>
@@ -2572,7 +2580,7 @@
       </p:sp>
       <p:sp>
         <p:nvSpPr>
-          <p:cNvPr id="77" name="PlaceHolder 4"/>
+          <p:cNvPr id="69" name="PlaceHolder 4"/>
           <p:cNvSpPr>
             <a:spLocks noGrp="1"/>
           </p:cNvSpPr>
@@ -2602,7 +2610,7 @@
       </p:sp>
       <p:sp>
         <p:nvSpPr>
-          <p:cNvPr id="78" name="PlaceHolder 5"/>
+          <p:cNvPr id="70" name="PlaceHolder 5"/>
           <p:cNvSpPr>
             <a:spLocks noGrp="1"/>
           </p:cNvSpPr>
@@ -2654,7 +2662,7 @@
       </p:grpSpPr>
       <p:sp>
         <p:nvSpPr>
-          <p:cNvPr id="79" name="PlaceHolder 1"/>
+          <p:cNvPr id="71" name="PlaceHolder 1"/>
           <p:cNvSpPr>
             <a:spLocks noGrp="1"/>
           </p:cNvSpPr>
@@ -2685,7 +2693,7 @@
       </p:sp>
       <p:sp>
         <p:nvSpPr>
-          <p:cNvPr id="80" name="PlaceHolder 2"/>
+          <p:cNvPr id="72" name="PlaceHolder 2"/>
           <p:cNvSpPr>
             <a:spLocks noGrp="1"/>
           </p:cNvSpPr>
@@ -2715,7 +2723,7 @@
       </p:sp>
       <p:sp>
         <p:nvSpPr>
-          <p:cNvPr id="81" name="PlaceHolder 3"/>
+          <p:cNvPr id="73" name="PlaceHolder 3"/>
           <p:cNvSpPr>
             <a:spLocks noGrp="1"/>
           </p:cNvSpPr>
@@ -2745,7 +2753,7 @@
       </p:sp>
       <p:sp>
         <p:nvSpPr>
-          <p:cNvPr id="82" name="PlaceHolder 4"/>
+          <p:cNvPr id="74" name="PlaceHolder 4"/>
           <p:cNvSpPr>
             <a:spLocks noGrp="1"/>
           </p:cNvSpPr>
@@ -2775,7 +2783,7 @@
       </p:sp>
       <p:sp>
         <p:nvSpPr>
-          <p:cNvPr id="83" name="PlaceHolder 5"/>
+          <p:cNvPr id="75" name="PlaceHolder 5"/>
           <p:cNvSpPr>
             <a:spLocks noGrp="1"/>
           </p:cNvSpPr>
@@ -2805,7 +2813,7 @@
       </p:sp>
       <p:sp>
         <p:nvSpPr>
-          <p:cNvPr id="84" name="PlaceHolder 6"/>
+          <p:cNvPr id="76" name="PlaceHolder 6"/>
           <p:cNvSpPr>
             <a:spLocks noGrp="1"/>
           </p:cNvSpPr>
@@ -2835,7 +2843,7 @@
       </p:sp>
       <p:sp>
         <p:nvSpPr>
-          <p:cNvPr id="85" name="PlaceHolder 7"/>
+          <p:cNvPr id="77" name="PlaceHolder 7"/>
           <p:cNvSpPr>
             <a:spLocks noGrp="1"/>
           </p:cNvSpPr>
@@ -2887,7 +2895,7 @@
       </p:grpSpPr>
       <p:sp>
         <p:nvSpPr>
-          <p:cNvPr id="11" name="PlaceHolder 1"/>
+          <p:cNvPr id="5" name="PlaceHolder 1"/>
           <p:cNvSpPr>
             <a:spLocks noGrp="1"/>
           </p:cNvSpPr>
@@ -2918,7 +2926,7 @@
       </p:sp>
       <p:sp>
         <p:nvSpPr>
-          <p:cNvPr id="12" name="PlaceHolder 2"/>
+          <p:cNvPr id="6" name="PlaceHolder 2"/>
           <p:cNvSpPr>
             <a:spLocks noGrp="1"/>
           </p:cNvSpPr>
@@ -2970,7 +2978,7 @@
       </p:grpSpPr>
       <p:sp>
         <p:nvSpPr>
-          <p:cNvPr id="13" name="PlaceHolder 1"/>
+          <p:cNvPr id="7" name="PlaceHolder 1"/>
           <p:cNvSpPr>
             <a:spLocks noGrp="1"/>
           </p:cNvSpPr>
@@ -3001,7 +3009,7 @@
       </p:sp>
       <p:sp>
         <p:nvSpPr>
-          <p:cNvPr id="14" name="PlaceHolder 2"/>
+          <p:cNvPr id="8" name="PlaceHolder 2"/>
           <p:cNvSpPr>
             <a:spLocks noGrp="1"/>
           </p:cNvSpPr>
@@ -3031,7 +3039,7 @@
       </p:sp>
       <p:sp>
         <p:nvSpPr>
-          <p:cNvPr id="15" name="PlaceHolder 3"/>
+          <p:cNvPr id="9" name="PlaceHolder 3"/>
           <p:cNvSpPr>
             <a:spLocks noGrp="1"/>
           </p:cNvSpPr>
@@ -3083,7 +3091,7 @@
       </p:grpSpPr>
       <p:sp>
         <p:nvSpPr>
-          <p:cNvPr id="16" name="PlaceHolder 1"/>
+          <p:cNvPr id="10" name="PlaceHolder 1"/>
           <p:cNvSpPr>
             <a:spLocks noGrp="1"/>
           </p:cNvSpPr>
@@ -3136,7 +3144,7 @@
       </p:grpSpPr>
       <p:sp>
         <p:nvSpPr>
-          <p:cNvPr id="17" name="PlaceHolder 1"/>
+          <p:cNvPr id="11" name="PlaceHolder 1"/>
           <p:cNvSpPr>
             <a:spLocks noGrp="1"/>
           </p:cNvSpPr>
@@ -3189,7 +3197,7 @@
       </p:grpSpPr>
       <p:sp>
         <p:nvSpPr>
-          <p:cNvPr id="18" name="PlaceHolder 1"/>
+          <p:cNvPr id="12" name="PlaceHolder 1"/>
           <p:cNvSpPr>
             <a:spLocks noGrp="1"/>
           </p:cNvSpPr>
@@ -3220,7 +3228,7 @@
       </p:sp>
       <p:sp>
         <p:nvSpPr>
-          <p:cNvPr id="19" name="PlaceHolder 2"/>
+          <p:cNvPr id="13" name="PlaceHolder 2"/>
           <p:cNvSpPr>
             <a:spLocks noGrp="1"/>
           </p:cNvSpPr>
@@ -3250,7 +3258,7 @@
       </p:sp>
       <p:sp>
         <p:nvSpPr>
-          <p:cNvPr id="20" name="PlaceHolder 3"/>
+          <p:cNvPr id="14" name="PlaceHolder 3"/>
           <p:cNvSpPr>
             <a:spLocks noGrp="1"/>
           </p:cNvSpPr>
@@ -3280,7 +3288,7 @@
       </p:sp>
       <p:sp>
         <p:nvSpPr>
-          <p:cNvPr id="21" name="PlaceHolder 4"/>
+          <p:cNvPr id="15" name="PlaceHolder 4"/>
           <p:cNvSpPr>
             <a:spLocks noGrp="1"/>
           </p:cNvSpPr>
@@ -3332,7 +3340,7 @@
       </p:grpSpPr>
       <p:sp>
         <p:nvSpPr>
-          <p:cNvPr id="22" name="PlaceHolder 1"/>
+          <p:cNvPr id="16" name="PlaceHolder 1"/>
           <p:cNvSpPr>
             <a:spLocks noGrp="1"/>
           </p:cNvSpPr>
@@ -3363,7 +3371,7 @@
       </p:sp>
       <p:sp>
         <p:nvSpPr>
-          <p:cNvPr id="23" name="PlaceHolder 2"/>
+          <p:cNvPr id="17" name="PlaceHolder 2"/>
           <p:cNvSpPr>
             <a:spLocks noGrp="1"/>
           </p:cNvSpPr>
@@ -3393,7 +3401,7 @@
       </p:sp>
       <p:sp>
         <p:nvSpPr>
-          <p:cNvPr id="24" name="PlaceHolder 3"/>
+          <p:cNvPr id="18" name="PlaceHolder 3"/>
           <p:cNvSpPr>
             <a:spLocks noGrp="1"/>
           </p:cNvSpPr>
@@ -3423,7 +3431,7 @@
       </p:sp>
       <p:sp>
         <p:nvSpPr>
-          <p:cNvPr id="25" name="PlaceHolder 4"/>
+          <p:cNvPr id="19" name="PlaceHolder 4"/>
           <p:cNvSpPr>
             <a:spLocks noGrp="1"/>
           </p:cNvSpPr>
@@ -3475,7 +3483,7 @@
       </p:grpSpPr>
       <p:sp>
         <p:nvSpPr>
-          <p:cNvPr id="26" name="PlaceHolder 1"/>
+          <p:cNvPr id="20" name="PlaceHolder 1"/>
           <p:cNvSpPr>
             <a:spLocks noGrp="1"/>
           </p:cNvSpPr>
@@ -3506,7 +3514,7 @@
       </p:sp>
       <p:sp>
         <p:nvSpPr>
-          <p:cNvPr id="27" name="PlaceHolder 2"/>
+          <p:cNvPr id="21" name="PlaceHolder 2"/>
           <p:cNvSpPr>
             <a:spLocks noGrp="1"/>
           </p:cNvSpPr>
@@ -3536,7 +3544,7 @@
       </p:sp>
       <p:sp>
         <p:nvSpPr>
-          <p:cNvPr id="28" name="PlaceHolder 3"/>
+          <p:cNvPr id="22" name="PlaceHolder 3"/>
           <p:cNvSpPr>
             <a:spLocks noGrp="1"/>
           </p:cNvSpPr>
@@ -3566,7 +3574,7 @@
       </p:sp>
       <p:sp>
         <p:nvSpPr>
-          <p:cNvPr id="29" name="PlaceHolder 4"/>
+          <p:cNvPr id="23" name="PlaceHolder 4"/>
           <p:cNvSpPr>
             <a:spLocks noGrp="1"/>
           </p:cNvSpPr>
@@ -3623,58 +3631,9 @@
           <a:chExt cx="0" cy="0"/>
         </a:xfrm>
       </p:grpSpPr>
-      <p:sp>
-        <p:nvSpPr>
-          <p:cNvPr id="0" name="CustomShape 1"/>
-          <p:cNvSpPr/>
-          <p:nvPr/>
-        </p:nvSpPr>
-        <p:spPr>
-          <a:xfrm>
-            <a:off x="0" y="863640"/>
-            <a:ext cx="5616360" cy="106920"/>
-          </a:xfrm>
-          <a:prstGeom prst="rect">
-            <a:avLst/>
-          </a:prstGeom>
-          <a:gradFill rotWithShape="0">
-            <a:gsLst>
-              <a:gs pos="0">
-                <a:srgbClr val="4f81bd"/>
-              </a:gs>
-              <a:gs pos="100000">
-                <a:srgbClr val="ffffff"/>
-              </a:gs>
-            </a:gsLst>
-            <a:lin ang="0"/>
-          </a:gradFill>
-          <a:ln>
-            <a:noFill/>
-          </a:ln>
-          <a:effectLst>
-            <a:outerShdw blurRad="40000" dir="5400000" dist="23040" rotWithShape="0">
-              <a:srgbClr val="000000">
-                <a:alpha val="35000"/>
-              </a:srgbClr>
-            </a:outerShdw>
-          </a:effectLst>
-        </p:spPr>
-        <p:style>
-          <a:lnRef idx="1">
-            <a:schemeClr val="accent1"/>
-          </a:lnRef>
-          <a:fillRef idx="3">
-            <a:schemeClr val="accent1"/>
-          </a:fillRef>
-          <a:effectRef idx="2">
-            <a:schemeClr val="accent1"/>
-          </a:effectRef>
-          <a:fontRef idx="minor"/>
-        </p:style>
-      </p:sp>
       <p:pic>
         <p:nvPicPr>
-          <p:cNvPr id="1" name="Picture 2" descr=""/>
+          <p:cNvPr id="0" name="Grafik 11_0" descr=""/>
           <p:cNvPicPr/>
           <p:nvPr/>
         </p:nvPicPr>
@@ -3684,8 +3643,8 @@
         </p:blipFill>
         <p:spPr>
           <a:xfrm>
-            <a:off x="8157240" y="111960"/>
-            <a:ext cx="833040" cy="895680"/>
+            <a:off x="0" y="0"/>
+            <a:ext cx="9223200" cy="6917040"/>
           </a:xfrm>
           <a:prstGeom prst="rect">
             <a:avLst/>
@@ -3695,124 +3654,9 @@
           </a:ln>
         </p:spPr>
       </p:pic>
-      <p:pic>
-        <p:nvPicPr>
-          <p:cNvPr id="2" name="Bild 1" descr=""/>
-          <p:cNvPicPr/>
-          <p:nvPr/>
-        </p:nvPicPr>
-        <p:blipFill>
-          <a:blip r:embed="rId3"/>
-          <a:stretch/>
-        </p:blipFill>
-        <p:spPr>
-          <a:xfrm>
-            <a:off x="-16920" y="-3240"/>
-            <a:ext cx="1834920" cy="1834920"/>
-          </a:xfrm>
-          <a:prstGeom prst="rect">
-            <a:avLst/>
-          </a:prstGeom>
-          <a:ln>
-            <a:noFill/>
-          </a:ln>
-        </p:spPr>
-      </p:pic>
-      <p:pic>
-        <p:nvPicPr>
-          <p:cNvPr id="3" name="Bild 6" descr=""/>
-          <p:cNvPicPr/>
-          <p:nvPr/>
-        </p:nvPicPr>
-        <p:blipFill>
-          <a:blip r:embed="rId4"/>
-          <a:stretch/>
-        </p:blipFill>
-        <p:spPr>
-          <a:xfrm>
-            <a:off x="1819080" y="0"/>
-            <a:ext cx="1834920" cy="1834920"/>
-          </a:xfrm>
-          <a:prstGeom prst="rect">
-            <a:avLst/>
-          </a:prstGeom>
-          <a:ln>
-            <a:noFill/>
-          </a:ln>
-        </p:spPr>
-      </p:pic>
-      <p:pic>
-        <p:nvPicPr>
-          <p:cNvPr id="4" name="Bild 9" descr=""/>
-          <p:cNvPicPr/>
-          <p:nvPr/>
-        </p:nvPicPr>
-        <p:blipFill>
-          <a:blip r:embed="rId5"/>
-          <a:stretch/>
-        </p:blipFill>
-        <p:spPr>
-          <a:xfrm>
-            <a:off x="3655080" y="0"/>
-            <a:ext cx="1834920" cy="1834920"/>
-          </a:xfrm>
-          <a:prstGeom prst="rect">
-            <a:avLst/>
-          </a:prstGeom>
-          <a:ln>
-            <a:noFill/>
-          </a:ln>
-        </p:spPr>
-      </p:pic>
-      <p:pic>
-        <p:nvPicPr>
-          <p:cNvPr id="5" name="Bild 12" descr=""/>
-          <p:cNvPicPr/>
-          <p:nvPr/>
-        </p:nvPicPr>
-        <p:blipFill>
-          <a:blip r:embed="rId6"/>
-          <a:stretch/>
-        </p:blipFill>
-        <p:spPr>
-          <a:xfrm>
-            <a:off x="7327080" y="0"/>
-            <a:ext cx="1834920" cy="1834920"/>
-          </a:xfrm>
-          <a:prstGeom prst="rect">
-            <a:avLst/>
-          </a:prstGeom>
-          <a:ln>
-            <a:noFill/>
-          </a:ln>
-        </p:spPr>
-      </p:pic>
-      <p:pic>
-        <p:nvPicPr>
-          <p:cNvPr id="6" name="Bild 13" descr=""/>
-          <p:cNvPicPr/>
-          <p:nvPr/>
-        </p:nvPicPr>
-        <p:blipFill>
-          <a:blip r:embed="rId7"/>
-          <a:stretch/>
-        </p:blipFill>
-        <p:spPr>
-          <a:xfrm>
-            <a:off x="5491080" y="0"/>
-            <a:ext cx="1834920" cy="1834920"/>
-          </a:xfrm>
-          <a:prstGeom prst="rect">
-            <a:avLst/>
-          </a:prstGeom>
-          <a:ln>
-            <a:noFill/>
-          </a:ln>
-        </p:spPr>
-      </p:pic>
-      <p:sp>
-        <p:nvSpPr>
-          <p:cNvPr id="7" name="PlaceHolder 2"/>
+      <p:sp>
+        <p:nvSpPr>
+          <p:cNvPr id="1" name="PlaceHolder 1"/>
           <p:cNvSpPr>
             <a:spLocks noGrp="1"/>
           </p:cNvSpPr>
@@ -3839,25 +3683,7 @@
               <a:rPr b="0" lang="en-GB" sz="4400" spc="-1" strike="noStrike">
                 <a:latin typeface="Arial"/>
               </a:rPr>
-              <a:t>Click to </a:t>
-            </a:r>
-            <a:r>
-              <a:rPr b="0" lang="en-GB" sz="4400" spc="-1" strike="noStrike">
-                <a:latin typeface="Arial"/>
-              </a:rPr>
-              <a:t>edit the </a:t>
-            </a:r>
-            <a:r>
-              <a:rPr b="0" lang="en-GB" sz="4400" spc="-1" strike="noStrike">
-                <a:latin typeface="Arial"/>
-              </a:rPr>
-              <a:t>title text </a:t>
-            </a:r>
-            <a:r>
-              <a:rPr b="0" lang="en-GB" sz="4400" spc="-1" strike="noStrike">
-                <a:latin typeface="Arial"/>
-              </a:rPr>
-              <a:t>format</a:t>
+              <a:t>Click to edit the title text format</a:t>
             </a:r>
             <a:endParaRPr b="0" lang="en-GB" sz="4400" spc="-1" strike="noStrike">
               <a:latin typeface="Arial"/>
@@ -3867,7 +3693,7 @@
       </p:sp>
       <p:sp>
         <p:nvSpPr>
-          <p:cNvPr id="8" name="PlaceHolder 3"/>
+          <p:cNvPr id="2" name="PlaceHolder 2"/>
           <p:cNvSpPr>
             <a:spLocks noGrp="1"/>
           </p:cNvSpPr>
@@ -4048,18 +3874,18 @@
   </p:cSld>
   <p:clrMap bg1="lt1" bg2="lt2" tx1="dk1" tx2="dk2" accent1="accent1" accent2="accent2" accent3="accent3" accent4="accent4" accent5="accent5" accent6="accent6" hlink="hlink" folHlink="folHlink"/>
   <p:sldLayoutIdLst>
-    <p:sldLayoutId id="2147483649" r:id="rId8"/>
-    <p:sldLayoutId id="2147483650" r:id="rId9"/>
-    <p:sldLayoutId id="2147483651" r:id="rId10"/>
-    <p:sldLayoutId id="2147483652" r:id="rId11"/>
-    <p:sldLayoutId id="2147483653" r:id="rId12"/>
-    <p:sldLayoutId id="2147483654" r:id="rId13"/>
-    <p:sldLayoutId id="2147483655" r:id="rId14"/>
-    <p:sldLayoutId id="2147483656" r:id="rId15"/>
-    <p:sldLayoutId id="2147483657" r:id="rId16"/>
-    <p:sldLayoutId id="2147483658" r:id="rId17"/>
-    <p:sldLayoutId id="2147483659" r:id="rId18"/>
-    <p:sldLayoutId id="2147483660" r:id="rId19"/>
+    <p:sldLayoutId id="2147483649" r:id="rId3"/>
+    <p:sldLayoutId id="2147483650" r:id="rId4"/>
+    <p:sldLayoutId id="2147483651" r:id="rId5"/>
+    <p:sldLayoutId id="2147483652" r:id="rId6"/>
+    <p:sldLayoutId id="2147483653" r:id="rId7"/>
+    <p:sldLayoutId id="2147483654" r:id="rId8"/>
+    <p:sldLayoutId id="2147483655" r:id="rId9"/>
+    <p:sldLayoutId id="2147483656" r:id="rId10"/>
+    <p:sldLayoutId id="2147483657" r:id="rId11"/>
+    <p:sldLayoutId id="2147483658" r:id="rId12"/>
+    <p:sldLayoutId id="2147483659" r:id="rId13"/>
+    <p:sldLayoutId id="2147483660" r:id="rId14"/>
   </p:sldLayoutIdLst>
 </p:sldMaster>
 </file>
@@ -4088,58 +3914,9 @@
           <a:chExt cx="0" cy="0"/>
         </a:xfrm>
       </p:grpSpPr>
-      <p:sp>
-        <p:nvSpPr>
-          <p:cNvPr id="45" name="CustomShape 1"/>
-          <p:cNvSpPr/>
-          <p:nvPr/>
-        </p:nvSpPr>
-        <p:spPr>
-          <a:xfrm>
-            <a:off x="0" y="863640"/>
-            <a:ext cx="5616360" cy="106920"/>
-          </a:xfrm>
-          <a:prstGeom prst="rect">
-            <a:avLst/>
-          </a:prstGeom>
-          <a:gradFill rotWithShape="0">
-            <a:gsLst>
-              <a:gs pos="0">
-                <a:srgbClr val="4f81bd"/>
-              </a:gs>
-              <a:gs pos="100000">
-                <a:srgbClr val="ffffff"/>
-              </a:gs>
-            </a:gsLst>
-            <a:lin ang="0"/>
-          </a:gradFill>
-          <a:ln>
-            <a:noFill/>
-          </a:ln>
-          <a:effectLst>
-            <a:outerShdw blurRad="40000" dir="5400000" dist="23040" rotWithShape="0">
-              <a:srgbClr val="000000">
-                <a:alpha val="35000"/>
-              </a:srgbClr>
-            </a:outerShdw>
-          </a:effectLst>
-        </p:spPr>
-        <p:style>
-          <a:lnRef idx="1">
-            <a:schemeClr val="accent1"/>
-          </a:lnRef>
-          <a:fillRef idx="3">
-            <a:schemeClr val="accent1"/>
-          </a:fillRef>
-          <a:effectRef idx="2">
-            <a:schemeClr val="accent1"/>
-          </a:effectRef>
-          <a:fontRef idx="minor"/>
-        </p:style>
-      </p:sp>
       <p:pic>
         <p:nvPicPr>
-          <p:cNvPr id="46" name="Picture 2" descr=""/>
+          <p:cNvPr id="39" name="Grafik 7" descr=""/>
           <p:cNvPicPr/>
           <p:nvPr/>
         </p:nvPicPr>
@@ -4149,8 +3926,8 @@
         </p:blipFill>
         <p:spPr>
           <a:xfrm>
-            <a:off x="8157240" y="111960"/>
-            <a:ext cx="833040" cy="895680"/>
+            <a:off x="360" y="360"/>
+            <a:ext cx="9142920" cy="6856920"/>
           </a:xfrm>
           <a:prstGeom prst="rect">
             <a:avLst/>
@@ -4162,56 +3939,7 @@
       </p:pic>
       <p:sp>
         <p:nvSpPr>
-          <p:cNvPr id="47" name="CustomShape 2"/>
-          <p:cNvSpPr/>
-          <p:nvPr/>
-        </p:nvSpPr>
-        <p:spPr>
-          <a:xfrm>
-            <a:off x="0" y="875160"/>
-            <a:ext cx="5616360" cy="106920"/>
-          </a:xfrm>
-          <a:prstGeom prst="rect">
-            <a:avLst/>
-          </a:prstGeom>
-          <a:gradFill rotWithShape="0">
-            <a:gsLst>
-              <a:gs pos="0">
-                <a:srgbClr val="4f81bd"/>
-              </a:gs>
-              <a:gs pos="100000">
-                <a:srgbClr val="ffffff"/>
-              </a:gs>
-            </a:gsLst>
-            <a:lin ang="0"/>
-          </a:gradFill>
-          <a:ln>
-            <a:noFill/>
-          </a:ln>
-          <a:effectLst>
-            <a:outerShdw blurRad="40000" dir="5400000" dist="21600" rotWithShape="0">
-              <a:srgbClr val="000000">
-                <a:alpha val="35000"/>
-              </a:srgbClr>
-            </a:outerShdw>
-          </a:effectLst>
-        </p:spPr>
-        <p:style>
-          <a:lnRef idx="1">
-            <a:schemeClr val="accent1"/>
-          </a:lnRef>
-          <a:fillRef idx="3">
-            <a:schemeClr val="accent1"/>
-          </a:fillRef>
-          <a:effectRef idx="2">
-            <a:schemeClr val="accent1"/>
-          </a:effectRef>
-          <a:fontRef idx="minor"/>
-        </p:style>
-      </p:sp>
-      <p:sp>
-        <p:nvSpPr>
-          <p:cNvPr id="48" name="PlaceHolder 3"/>
+          <p:cNvPr id="40" name="PlaceHolder 1"/>
           <p:cNvSpPr>
             <a:spLocks noGrp="1"/>
           </p:cNvSpPr>
@@ -4248,7 +3976,7 @@
       </p:sp>
       <p:sp>
         <p:nvSpPr>
-          <p:cNvPr id="49" name="PlaceHolder 4"/>
+          <p:cNvPr id="41" name="PlaceHolder 2"/>
           <p:cNvSpPr>
             <a:spLocks noGrp="1"/>
           </p:cNvSpPr>
@@ -4464,14 +4192,14 @@
       </p:grpSpPr>
       <p:sp>
         <p:nvSpPr>
-          <p:cNvPr id="92" name="CustomShape 1"/>
+          <p:cNvPr id="84" name="CustomShape 1"/>
           <p:cNvSpPr/>
           <p:nvPr/>
         </p:nvSpPr>
         <p:spPr>
           <a:xfrm>
             <a:off x="816480" y="2574720"/>
-            <a:ext cx="7479000" cy="1468800"/>
+            <a:ext cx="7477920" cy="1467720"/>
           </a:xfrm>
           <a:prstGeom prst="rect">
             <a:avLst/>
@@ -4500,7 +4228,7 @@
             <a:r>
               <a:rPr b="0" lang="de-CH" sz="4000" spc="-1" strike="noStrike">
                 <a:solidFill>
-                  <a:srgbClr val="17375e"/>
+                  <a:srgbClr val="ffffff"/>
                 </a:solidFill>
                 <a:latin typeface="Calibri"/>
                 <a:ea typeface="DejaVu Sans"/>
@@ -4508,21 +4236,47 @@
               <a:t>RangeShiftR</a:t>
             </a:r>
             <a:endParaRPr b="0" lang="en-GB" sz="4000" spc="-1" strike="noStrike">
-              <a:latin typeface="Arial"/>
-            </a:endParaRPr>
-          </a:p>
-        </p:txBody>
-      </p:sp>
-      <p:sp>
-        <p:nvSpPr>
-          <p:cNvPr id="93" name="CustomShape 2"/>
+              <a:solidFill>
+                <a:srgbClr val="b2b2b2"/>
+              </a:solidFill>
+              <a:latin typeface="Arial"/>
+            </a:endParaRPr>
+          </a:p>
+          <a:p>
+            <a:pPr algn="ctr">
+              <a:lnSpc>
+                <a:spcPct val="100000"/>
+              </a:lnSpc>
+            </a:pPr>
+            <a:r>
+              <a:rPr b="0" lang="de-CH" sz="4000" spc="-1" strike="noStrike">
+                <a:solidFill>
+                  <a:srgbClr val="ffffff"/>
+                </a:solidFill>
+                <a:latin typeface="Calibri"/>
+                <a:ea typeface="DejaVu Sans"/>
+              </a:rPr>
+              <a:t>Overview</a:t>
+            </a:r>
+            <a:endParaRPr b="0" lang="en-GB" sz="4000" spc="-1" strike="noStrike">
+              <a:solidFill>
+                <a:srgbClr val="b2b2b2"/>
+              </a:solidFill>
+              <a:latin typeface="Arial"/>
+            </a:endParaRPr>
+          </a:p>
+        </p:txBody>
+      </p:sp>
+      <p:sp>
+        <p:nvSpPr>
+          <p:cNvPr id="85" name="CustomShape 2"/>
           <p:cNvSpPr/>
           <p:nvPr/>
         </p:nvSpPr>
         <p:spPr>
           <a:xfrm>
             <a:off x="239040" y="4779720"/>
-            <a:ext cx="8679600" cy="1347120"/>
+            <a:ext cx="8678520" cy="1346040"/>
           </a:xfrm>
           <a:prstGeom prst="rect">
             <a:avLst/>
@@ -4557,7 +4311,7 @@
             <a:r>
               <a:rPr b="1" lang="de-DE" sz="2400" spc="-1" strike="noStrike">
                 <a:solidFill>
-                  <a:srgbClr val="000000"/>
+                  <a:srgbClr val="e4e3ee"/>
                 </a:solidFill>
                 <a:latin typeface="Calibri"/>
                 <a:ea typeface="DejaVu Sans"/>
@@ -4565,34 +4319,9 @@
               <a:t>Damaris Zurell, Anne Malchow</a:t>
             </a:r>
             <a:endParaRPr b="0" lang="en-GB" sz="2400" spc="-1" strike="noStrike">
-              <a:latin typeface="Arial"/>
-            </a:endParaRPr>
-          </a:p>
-          <a:p>
-            <a:pPr algn="ctr">
-              <a:lnSpc>
-                <a:spcPct val="100000"/>
-              </a:lnSpc>
-              <a:spcBef>
-                <a:spcPts val="479"/>
-              </a:spcBef>
-              <a:tabLst>
-                <a:tab algn="l" pos="0"/>
-              </a:tabLst>
-            </a:pPr>
-            <a:r>
-              <a:rPr b="0" lang="de-DE" sz="2400" spc="-1" strike="noStrike" u="sng">
-                <a:solidFill>
-                  <a:srgbClr val="0000ff"/>
-                </a:solidFill>
-                <a:uFillTx/>
-                <a:latin typeface="Calibri"/>
-                <a:ea typeface="DejaVu Sans"/>
-                <a:hlinkClick r:id="rId1"/>
-              </a:rPr>
-              <a:t>https://damariszurell.github.io</a:t>
-            </a:r>
-            <a:endParaRPr b="0" lang="en-GB" sz="2400" spc="-1" strike="noStrike">
+              <a:solidFill>
+                <a:srgbClr val="b2b2b2"/>
+              </a:solidFill>
               <a:latin typeface="Arial"/>
             </a:endParaRPr>
           </a:p>
@@ -4611,7 +4340,36 @@
             <a:r>
               <a:rPr b="0" lang="de-CH" sz="2400" spc="-1" strike="noStrike">
                 <a:solidFill>
-                  <a:srgbClr val="000000"/>
+                  <a:srgbClr val="d0cfdb"/>
+                </a:solidFill>
+                <a:latin typeface="Calibri"/>
+                <a:ea typeface="DejaVu Sans"/>
+              </a:rPr>
+              <a:t>https://bit.ly/Potsdam-Macroecology</a:t>
+            </a:r>
+            <a:endParaRPr b="0" lang="en-GB" sz="2400" spc="-1" strike="noStrike">
+              <a:solidFill>
+                <a:srgbClr val="b2b2b2"/>
+              </a:solidFill>
+              <a:latin typeface="Arial"/>
+            </a:endParaRPr>
+          </a:p>
+          <a:p>
+            <a:pPr algn="ctr">
+              <a:lnSpc>
+                <a:spcPct val="100000"/>
+              </a:lnSpc>
+              <a:spcBef>
+                <a:spcPts val="479"/>
+              </a:spcBef>
+              <a:tabLst>
+                <a:tab algn="l" pos="0"/>
+              </a:tabLst>
+            </a:pPr>
+            <a:r>
+              <a:rPr b="0" lang="de-CH" sz="2400" spc="-1" strike="noStrike">
+                <a:solidFill>
+                  <a:srgbClr val="d0cfdb"/>
                 </a:solidFill>
                 <a:latin typeface="Calibri"/>
                 <a:ea typeface="DejaVu Sans"/>
@@ -4619,6 +4377,9 @@
               <a:t>@ZurellLab</a:t>
             </a:r>
             <a:endParaRPr b="0" lang="en-GB" sz="2400" spc="-1" strike="noStrike">
+              <a:solidFill>
+                <a:srgbClr val="b2b2b2"/>
+              </a:solidFill>
               <a:latin typeface="Arial"/>
             </a:endParaRPr>
           </a:p>
@@ -4635,6 +4396,9 @@
               </a:tabLst>
             </a:pPr>
             <a:endParaRPr b="0" lang="en-GB" sz="2400" spc="-1" strike="noStrike">
+              <a:solidFill>
+                <a:srgbClr val="b2b2b2"/>
+              </a:solidFill>
               <a:latin typeface="Arial"/>
             </a:endParaRPr>
           </a:p>
@@ -4651,6 +4415,9 @@
               </a:tabLst>
             </a:pPr>
             <a:endParaRPr b="0" lang="en-GB" sz="2400" spc="-1" strike="noStrike">
+              <a:solidFill>
+                <a:srgbClr val="b2b2b2"/>
+              </a:solidFill>
               <a:latin typeface="Arial"/>
             </a:endParaRPr>
           </a:p>
@@ -4667,57 +4434,9 @@
               </a:tabLst>
             </a:pPr>
             <a:endParaRPr b="0" lang="en-GB" sz="2400" spc="-1" strike="noStrike">
-              <a:latin typeface="Arial"/>
-            </a:endParaRPr>
-          </a:p>
-        </p:txBody>
-      </p:sp>
-      <p:sp>
-        <p:nvSpPr>
-          <p:cNvPr id="94" name="CustomShape 3"/>
-          <p:cNvSpPr/>
-          <p:nvPr/>
-        </p:nvSpPr>
-        <p:spPr>
-          <a:xfrm>
-            <a:off x="6343200" y="6611760"/>
-            <a:ext cx="2829240" cy="241920"/>
-          </a:xfrm>
-          <a:prstGeom prst="rect">
-            <a:avLst/>
-          </a:prstGeom>
-          <a:noFill/>
-          <a:ln>
-            <a:noFill/>
-          </a:ln>
-        </p:spPr>
-        <p:style>
-          <a:lnRef idx="0"/>
-          <a:fillRef idx="0"/>
-          <a:effectRef idx="0"/>
-          <a:fontRef idx="minor"/>
-        </p:style>
-        <p:txBody>
-          <a:bodyPr wrap="none" lIns="90000" rIns="90000" tIns="45000" bIns="45000">
-            <a:spAutoFit/>
-          </a:bodyPr>
-          <a:p>
-            <a:pPr>
-              <a:lnSpc>
-                <a:spcPct val="100000"/>
-              </a:lnSpc>
-            </a:pPr>
-            <a:r>
-              <a:rPr b="0" lang="de-DE" sz="1000" spc="-1" strike="noStrike">
-                <a:solidFill>
-                  <a:srgbClr val="808080"/>
-                </a:solidFill>
-                <a:latin typeface="Calibri"/>
-                <a:ea typeface="DejaVu Sans"/>
-              </a:rPr>
-              <a:t>Pictures from www.undekade-biologischevielfalt.de</a:t>
-            </a:r>
-            <a:endParaRPr b="0" lang="en-GB" sz="1000" spc="-1" strike="noStrike">
+              <a:solidFill>
+                <a:srgbClr val="b2b2b2"/>
+              </a:solidFill>
               <a:latin typeface="Arial"/>
             </a:endParaRPr>
           </a:p>
@@ -4725,41 +4444,18 @@
       </p:sp>
       <p:pic>
         <p:nvPicPr>
-          <p:cNvPr id="95" name="Picture 4" descr=""/>
+          <p:cNvPr id="86" name="" descr=""/>
           <p:cNvPicPr/>
           <p:nvPr/>
         </p:nvPicPr>
         <p:blipFill>
-          <a:blip r:embed="rId2"/>
+          <a:blip r:embed="rId1"/>
           <a:stretch/>
         </p:blipFill>
         <p:spPr>
           <a:xfrm>
-            <a:off x="39240" y="5503680"/>
-            <a:ext cx="1160280" cy="1247400"/>
-          </a:xfrm>
-          <a:prstGeom prst="rect">
-            <a:avLst/>
-          </a:prstGeom>
-          <a:ln>
-            <a:noFill/>
-          </a:ln>
-        </p:spPr>
-      </p:pic>
-      <p:pic>
-        <p:nvPicPr>
-          <p:cNvPr id="96" name="Picture 2" descr="Bildergebnis für twitter icon"/>
-          <p:cNvPicPr/>
-          <p:nvPr/>
-        </p:nvPicPr>
-        <p:blipFill>
-          <a:blip r:embed="rId3"/>
-          <a:stretch/>
-        </p:blipFill>
-        <p:spPr>
-          <a:xfrm>
-            <a:off x="3381840" y="5673240"/>
-            <a:ext cx="446400" cy="363600"/>
+            <a:off x="3322800" y="5652000"/>
+            <a:ext cx="492480" cy="437760"/>
           </a:xfrm>
           <a:prstGeom prst="rect">
             <a:avLst/>
@@ -4801,14 +4497,14 @@
       </p:grpSpPr>
       <p:sp>
         <p:nvSpPr>
-          <p:cNvPr id="97" name="CustomShape 1"/>
+          <p:cNvPr id="87" name="CustomShape 1"/>
           <p:cNvSpPr/>
           <p:nvPr/>
         </p:nvSpPr>
         <p:spPr>
           <a:xfrm>
             <a:off x="457200" y="207000"/>
-            <a:ext cx="8228520" cy="503280"/>
+            <a:ext cx="8227440" cy="502200"/>
           </a:xfrm>
           <a:prstGeom prst="rect">
             <a:avLst/>
@@ -4845,21 +4541,24 @@
               <a:t>Spatially explicit population models</a:t>
             </a:r>
             <a:endParaRPr b="0" lang="en-GB" sz="2600" spc="-1" strike="noStrike">
-              <a:latin typeface="Arial"/>
-            </a:endParaRPr>
-          </a:p>
-        </p:txBody>
-      </p:sp>
-      <p:sp>
-        <p:nvSpPr>
-          <p:cNvPr id="98" name="CustomShape 2"/>
+              <a:solidFill>
+                <a:srgbClr val="b2b2b2"/>
+              </a:solidFill>
+              <a:latin typeface="Arial"/>
+            </a:endParaRPr>
+          </a:p>
+        </p:txBody>
+      </p:sp>
+      <p:sp>
+        <p:nvSpPr>
+          <p:cNvPr id="88" name="CustomShape 2"/>
           <p:cNvSpPr/>
           <p:nvPr/>
         </p:nvSpPr>
         <p:spPr>
           <a:xfrm>
             <a:off x="457200" y="1236240"/>
-            <a:ext cx="8228520" cy="4888800"/>
+            <a:ext cx="8227440" cy="4887720"/>
           </a:xfrm>
           <a:prstGeom prst="rect">
             <a:avLst/>
@@ -4880,7 +4579,7 @@
             <a:noAutofit/>
           </a:bodyPr>
           <a:p>
-            <a:pPr marL="343080" indent="-342000">
+            <a:pPr marL="343080" indent="-340920">
               <a:lnSpc>
                 <a:spcPct val="100000"/>
               </a:lnSpc>
@@ -4904,6 +4603,9 @@
               <a:t>Simulating local population dynamics and dispersal</a:t>
             </a:r>
             <a:endParaRPr b="0" lang="en-GB" sz="2400" spc="-1" strike="noStrike">
+              <a:solidFill>
+                <a:srgbClr val="b2b2b2"/>
+              </a:solidFill>
               <a:latin typeface="Arial"/>
             </a:endParaRPr>
           </a:p>
@@ -4911,19 +4613,19 @@
       </p:sp>
       <p:pic>
         <p:nvPicPr>
-          <p:cNvPr id="99" name="Inhaltsplatzhalter 4" descr=""/>
+          <p:cNvPr id="89" name="Inhaltsplatzhalter 4" descr=""/>
           <p:cNvPicPr/>
           <p:nvPr/>
         </p:nvPicPr>
         <p:blipFill>
           <a:blip r:embed="rId1"/>
-          <a:srcRect l="12785" t="24615" r="48422" b="34194"/>
+          <a:srcRect l="12782" t="24621" r="48428" b="34199"/>
           <a:stretch/>
         </p:blipFill>
         <p:spPr>
           <a:xfrm>
             <a:off x="280440" y="3189960"/>
-            <a:ext cx="6787800" cy="3603960"/>
+            <a:ext cx="6786720" cy="3602880"/>
           </a:xfrm>
           <a:prstGeom prst="rect">
             <a:avLst/>
@@ -4935,7 +4637,7 @@
       </p:pic>
       <p:pic>
         <p:nvPicPr>
-          <p:cNvPr id="100" name="Bild 9" descr=""/>
+          <p:cNvPr id="90" name="Bild 9" descr=""/>
           <p:cNvPicPr/>
           <p:nvPr/>
         </p:nvPicPr>
@@ -4946,7 +4648,7 @@
         <p:spPr>
           <a:xfrm>
             <a:off x="4796640" y="2340000"/>
-            <a:ext cx="1078920" cy="1037880"/>
+            <a:ext cx="1077840" cy="1036800"/>
           </a:xfrm>
           <a:prstGeom prst="rect">
             <a:avLst/>
@@ -4958,7 +4660,7 @@
       </p:pic>
       <p:pic>
         <p:nvPicPr>
-          <p:cNvPr id="101" name="Bild 10" descr=""/>
+          <p:cNvPr id="91" name="Bild 10" descr=""/>
           <p:cNvPicPr/>
           <p:nvPr/>
         </p:nvPicPr>
@@ -4969,7 +4671,7 @@
         <p:spPr>
           <a:xfrm>
             <a:off x="1107360" y="2952000"/>
-            <a:ext cx="1555920" cy="1076040"/>
+            <a:ext cx="1554840" cy="1074960"/>
           </a:xfrm>
           <a:prstGeom prst="rect">
             <a:avLst/>
@@ -4981,14 +4683,14 @@
       </p:pic>
       <p:sp>
         <p:nvSpPr>
-          <p:cNvPr id="102" name="CustomShape 3"/>
+          <p:cNvPr id="92" name="CustomShape 3"/>
           <p:cNvSpPr/>
           <p:nvPr/>
         </p:nvSpPr>
         <p:spPr>
           <a:xfrm>
             <a:off x="2565000" y="3452760"/>
-            <a:ext cx="782280" cy="470520"/>
+            <a:ext cx="781200" cy="469440"/>
           </a:xfrm>
           <a:custGeom>
             <a:avLst/>
@@ -5037,14 +4739,14 @@
       </p:sp>
       <p:sp>
         <p:nvSpPr>
-          <p:cNvPr id="103" name="CustomShape 4"/>
+          <p:cNvPr id="93" name="CustomShape 4"/>
           <p:cNvSpPr/>
           <p:nvPr/>
         </p:nvSpPr>
         <p:spPr>
           <a:xfrm>
             <a:off x="5760000" y="4428000"/>
-            <a:ext cx="3275280" cy="1461240"/>
+            <a:ext cx="3274200" cy="1461240"/>
           </a:xfrm>
           <a:prstGeom prst="rect">
             <a:avLst/>
@@ -5085,6 +4787,9 @@
               <a:t>Landscape can be </a:t>
             </a:r>
             <a:endParaRPr b="0" lang="en-GB" sz="1800" spc="-1" strike="noStrike">
+              <a:solidFill>
+                <a:srgbClr val="b2b2b2"/>
+              </a:solidFill>
               <a:latin typeface="Arial"/>
             </a:endParaRPr>
           </a:p>
@@ -5105,11 +4810,14 @@
               <a:t>described as:</a:t>
             </a:r>
             <a:endParaRPr b="0" lang="en-GB" sz="1800" spc="-1" strike="noStrike">
-              <a:latin typeface="Arial"/>
-            </a:endParaRPr>
-          </a:p>
-          <a:p>
-            <a:pPr marL="72000" indent="-71280">
+              <a:solidFill>
+                <a:srgbClr val="b2b2b2"/>
+              </a:solidFill>
+              <a:latin typeface="Arial"/>
+            </a:endParaRPr>
+          </a:p>
+          <a:p>
+            <a:pPr marL="72000" indent="-70200">
               <a:lnSpc>
                 <a:spcPct val="100000"/>
               </a:lnSpc>
@@ -5131,11 +4839,14 @@
               <a:t>patch-matrix landscapes</a:t>
             </a:r>
             <a:endParaRPr b="0" lang="en-GB" sz="1800" spc="-1" strike="noStrike">
-              <a:latin typeface="Arial"/>
-            </a:endParaRPr>
-          </a:p>
-          <a:p>
-            <a:pPr marL="72000" indent="-71280">
+              <a:solidFill>
+                <a:srgbClr val="b2b2b2"/>
+              </a:solidFill>
+              <a:latin typeface="Arial"/>
+            </a:endParaRPr>
+          </a:p>
+          <a:p>
+            <a:pPr marL="72000" indent="-70200">
               <a:lnSpc>
                 <a:spcPct val="100000"/>
               </a:lnSpc>
@@ -5157,11 +4868,14 @@
               <a:t>patch types of different quality</a:t>
             </a:r>
             <a:endParaRPr b="0" lang="en-GB" sz="1800" spc="-1" strike="noStrike">
-              <a:latin typeface="Arial"/>
-            </a:endParaRPr>
-          </a:p>
-          <a:p>
-            <a:pPr marL="72000" indent="-71280">
+              <a:solidFill>
+                <a:srgbClr val="b2b2b2"/>
+              </a:solidFill>
+              <a:latin typeface="Arial"/>
+            </a:endParaRPr>
+          </a:p>
+          <a:p>
+            <a:pPr marL="72000" indent="-70200">
               <a:lnSpc>
                 <a:spcPct val="100000"/>
               </a:lnSpc>
@@ -5183,21 +4897,24 @@
               <a:t>grid cells of different quality</a:t>
             </a:r>
             <a:endParaRPr b="0" lang="en-GB" sz="1800" spc="-1" strike="noStrike">
-              <a:latin typeface="Arial"/>
-            </a:endParaRPr>
-          </a:p>
-        </p:txBody>
-      </p:sp>
-      <p:sp>
-        <p:nvSpPr>
-          <p:cNvPr id="104" name="CustomShape 5"/>
+              <a:solidFill>
+                <a:srgbClr val="b2b2b2"/>
+              </a:solidFill>
+              <a:latin typeface="Arial"/>
+            </a:endParaRPr>
+          </a:p>
+        </p:txBody>
+      </p:sp>
+      <p:sp>
+        <p:nvSpPr>
+          <p:cNvPr id="94" name="CustomShape 5"/>
           <p:cNvSpPr/>
           <p:nvPr/>
         </p:nvSpPr>
         <p:spPr>
           <a:xfrm>
             <a:off x="4098240" y="3049920"/>
-            <a:ext cx="878040" cy="1106280"/>
+            <a:ext cx="876960" cy="1105200"/>
           </a:xfrm>
           <a:custGeom>
             <a:avLst/>
@@ -5259,14 +4976,14 @@
       </p:sp>
       <p:sp>
         <p:nvSpPr>
-          <p:cNvPr id="105" name="CustomShape 6"/>
+          <p:cNvPr id="95" name="CustomShape 6"/>
           <p:cNvSpPr/>
           <p:nvPr/>
         </p:nvSpPr>
         <p:spPr>
           <a:xfrm>
             <a:off x="5868000" y="2362680"/>
-            <a:ext cx="2932200" cy="912600"/>
+            <a:ext cx="2931120" cy="912600"/>
           </a:xfrm>
           <a:prstGeom prst="rect">
             <a:avLst/>
@@ -5303,21 +5020,24 @@
               <a:t>Dispersal described by dispersal kernel or movement simulator</a:t>
             </a:r>
             <a:endParaRPr b="0" lang="en-GB" sz="1800" spc="-1" strike="noStrike">
-              <a:latin typeface="Arial"/>
-            </a:endParaRPr>
-          </a:p>
-        </p:txBody>
-      </p:sp>
-      <p:sp>
-        <p:nvSpPr>
-          <p:cNvPr id="106" name="CustomShape 7"/>
+              <a:solidFill>
+                <a:srgbClr val="b2b2b2"/>
+              </a:solidFill>
+              <a:latin typeface="Arial"/>
+            </a:endParaRPr>
+          </a:p>
+        </p:txBody>
+      </p:sp>
+      <p:sp>
+        <p:nvSpPr>
+          <p:cNvPr id="96" name="CustomShape 7"/>
           <p:cNvSpPr/>
           <p:nvPr/>
         </p:nvSpPr>
         <p:spPr>
           <a:xfrm>
             <a:off x="937080" y="1761120"/>
-            <a:ext cx="2932200" cy="1186920"/>
+            <a:ext cx="2931120" cy="1186920"/>
           </a:xfrm>
           <a:prstGeom prst="rect">
             <a:avLst/>
@@ -5354,6 +5074,9 @@
               <a:t>Local population dynamics described by population model, e.g. logistic growth or matrix population model</a:t>
             </a:r>
             <a:endParaRPr b="0" lang="en-GB" sz="1800" spc="-1" strike="noStrike">
+              <a:solidFill>
+                <a:srgbClr val="b2b2b2"/>
+              </a:solidFill>
               <a:latin typeface="Arial"/>
             </a:endParaRPr>
           </a:p>
@@ -5403,7 +5126,7 @@
                                           </p:stCondLst>
                                         </p:cTn>
                                         <p:tgtEl>
-                                          <p:spTgt spid="101"/>
+                                          <p:spTgt spid="91"/>
                                         </p:tgtEl>
                                         <p:attrNameLst>
                                           <p:attrName>style.visibility</p:attrName>
@@ -5430,7 +5153,7 @@
                                           </p:stCondLst>
                                         </p:cTn>
                                         <p:tgtEl>
-                                          <p:spTgt spid="102"/>
+                                          <p:spTgt spid="92"/>
                                         </p:tgtEl>
                                         <p:attrNameLst>
                                           <p:attrName>style.visibility</p:attrName>
@@ -5457,7 +5180,7 @@
                                           </p:stCondLst>
                                         </p:cTn>
                                         <p:tgtEl>
-                                          <p:spTgt spid="106"/>
+                                          <p:spTgt spid="96"/>
                                         </p:tgtEl>
                                         <p:attrNameLst>
                                           <p:attrName>style.visibility</p:attrName>
@@ -5502,7 +5225,7 @@
                                           </p:stCondLst>
                                         </p:cTn>
                                         <p:tgtEl>
-                                          <p:spTgt spid="104"/>
+                                          <p:spTgt spid="94"/>
                                         </p:tgtEl>
                                         <p:attrNameLst>
                                           <p:attrName>style.visibility</p:attrName>
@@ -5529,7 +5252,7 @@
                                           </p:stCondLst>
                                         </p:cTn>
                                         <p:tgtEl>
-                                          <p:spTgt spid="105"/>
+                                          <p:spTgt spid="95"/>
                                         </p:tgtEl>
                                         <p:attrNameLst>
                                           <p:attrName>style.visibility</p:attrName>
@@ -5556,7 +5279,7 @@
                                           </p:stCondLst>
                                         </p:cTn>
                                         <p:tgtEl>
-                                          <p:spTgt spid="100"/>
+                                          <p:spTgt spid="90"/>
                                         </p:tgtEl>
                                         <p:attrNameLst>
                                           <p:attrName>style.visibility</p:attrName>
@@ -5583,7 +5306,7 @@
                                           </p:stCondLst>
                                         </p:cTn>
                                         <p:tgtEl>
-                                          <p:spTgt spid="103"/>
+                                          <p:spTgt spid="93"/>
                                         </p:tgtEl>
                                         <p:attrNameLst>
                                           <p:attrName>style.visibility</p:attrName>
@@ -5646,7 +5369,7 @@
       </p:grpSpPr>
       <p:pic>
         <p:nvPicPr>
-          <p:cNvPr id="107" name="Image1" descr=""/>
+          <p:cNvPr id="97" name="Image1" descr=""/>
           <p:cNvPicPr/>
           <p:nvPr/>
         </p:nvPicPr>
@@ -5657,7 +5380,7 @@
         <p:spPr>
           <a:xfrm>
             <a:off x="1833120" y="1340280"/>
-            <a:ext cx="6763680" cy="4732920"/>
+            <a:ext cx="6762600" cy="4731840"/>
           </a:xfrm>
           <a:prstGeom prst="rect">
             <a:avLst/>
@@ -5669,7 +5392,7 @@
       </p:pic>
       <p:pic>
         <p:nvPicPr>
-          <p:cNvPr id="108" name="Grafik 11" descr=""/>
+          <p:cNvPr id="98" name="Grafik 11" descr=""/>
           <p:cNvPicPr/>
           <p:nvPr/>
         </p:nvPicPr>
@@ -5680,7 +5403,7 @@
         <p:spPr>
           <a:xfrm>
             <a:off x="238320" y="1254960"/>
-            <a:ext cx="1458000" cy="1488960"/>
+            <a:ext cx="1456920" cy="1487880"/>
           </a:xfrm>
           <a:prstGeom prst="rect">
             <a:avLst/>
@@ -5692,75 +5415,14 @@
       </p:pic>
       <p:sp>
         <p:nvSpPr>
-          <p:cNvPr id="109" name="CustomShape 1"/>
+          <p:cNvPr id="99" name="CustomShape 1"/>
           <p:cNvSpPr/>
           <p:nvPr/>
         </p:nvSpPr>
         <p:spPr>
           <a:xfrm>
-            <a:off x="241200" y="279000"/>
-            <a:ext cx="8228520" cy="503280"/>
-          </a:xfrm>
-          <a:prstGeom prst="rect">
-            <a:avLst/>
-          </a:prstGeom>
-          <a:noFill/>
-          <a:ln>
-            <a:noFill/>
-          </a:ln>
-        </p:spPr>
-        <p:style>
-          <a:lnRef idx="0"/>
-          <a:fillRef idx="0"/>
-          <a:effectRef idx="0"/>
-          <a:fontRef idx="minor"/>
-        </p:style>
-        <p:txBody>
-          <a:bodyPr lIns="0" rIns="0" tIns="0" bIns="0" anchor="ctr">
-            <a:noAutofit/>
-          </a:bodyPr>
-          <a:p>
-            <a:pPr>
-              <a:lnSpc>
-                <a:spcPct val="100000"/>
-              </a:lnSpc>
-            </a:pPr>
-            <a:r>
-              <a:rPr b="0" lang="de-DE" sz="2600" spc="-1" strike="noStrike">
-                <a:solidFill>
-                  <a:srgbClr val="17375e"/>
-                </a:solidFill>
-                <a:latin typeface="Calibri"/>
-                <a:ea typeface="DejaVu Sans"/>
-              </a:rPr>
-              <a:t>RangeShifter - </a:t>
-            </a:r>
-            <a:r>
-              <a:rPr b="0" lang="de-DE" sz="2000" spc="-1" strike="noStrike">
-                <a:solidFill>
-                  <a:srgbClr val="17375e"/>
-                </a:solidFill>
-                <a:latin typeface="Calibri"/>
-                <a:ea typeface="DejaVu Sans"/>
-              </a:rPr>
-              <a:t>An individual-based eco-evolutionary modelling platform</a:t>
-            </a:r>
-            <a:endParaRPr b="0" lang="en-GB" sz="2000" spc="-1" strike="noStrike">
-              <a:latin typeface="Arial"/>
-            </a:endParaRPr>
-          </a:p>
-        </p:txBody>
-      </p:sp>
-      <p:sp>
-        <p:nvSpPr>
-          <p:cNvPr id="110" name="CustomShape 2"/>
-          <p:cNvSpPr/>
-          <p:nvPr/>
-        </p:nvSpPr>
-        <p:spPr>
-          <a:xfrm>
             <a:off x="201600" y="6278040"/>
-            <a:ext cx="6482160" cy="394200"/>
+            <a:ext cx="6481440" cy="394200"/>
           </a:xfrm>
           <a:prstGeom prst="rect">
             <a:avLst/>
@@ -5797,6 +5459,9 @@
               <a:t>Malchow et al. (2021) Ecography. DOI: 10.1111/ecog.05689 .</a:t>
             </a:r>
             <a:endParaRPr b="0" lang="en-GB" sz="1000" spc="-1" strike="noStrike">
+              <a:solidFill>
+                <a:srgbClr val="b2b2b2"/>
+              </a:solidFill>
               <a:latin typeface="Arial"/>
             </a:endParaRPr>
           </a:p>
@@ -5817,6 +5482,9 @@
               <a:t>Building on  Bocedi et al. (2014) Methods Ecol Evol 5: 388-396. &amp; Bocedi et al. (2021) Ecography. DOI: 10.1111/ecog.05687.</a:t>
             </a:r>
             <a:endParaRPr b="0" lang="en-GB" sz="1000" spc="-1" strike="noStrike">
+              <a:solidFill>
+                <a:srgbClr val="b2b2b2"/>
+              </a:solidFill>
               <a:latin typeface="Arial"/>
             </a:endParaRPr>
           </a:p>
@@ -5824,7 +5492,7 @@
       </p:sp>
       <p:pic>
         <p:nvPicPr>
-          <p:cNvPr id="111" name="Bild 14" descr=""/>
+          <p:cNvPr id="100" name="Bild 14" descr=""/>
           <p:cNvPicPr/>
           <p:nvPr/>
         </p:nvPicPr>
@@ -5835,7 +5503,7 @@
         <p:spPr>
           <a:xfrm>
             <a:off x="7632720" y="5965560"/>
-            <a:ext cx="1280160" cy="639360"/>
+            <a:ext cx="1279080" cy="638280"/>
           </a:xfrm>
           <a:prstGeom prst="rect">
             <a:avLst/>
@@ -5845,6 +5513,137 @@
           </a:ln>
         </p:spPr>
       </p:pic>
+      <p:sp>
+        <p:nvSpPr>
+          <p:cNvPr id="101" name="CustomShape 2"/>
+          <p:cNvSpPr/>
+          <p:nvPr/>
+        </p:nvSpPr>
+        <p:spPr>
+          <a:xfrm>
+            <a:off x="313200" y="171000"/>
+            <a:ext cx="2134080" cy="502200"/>
+          </a:xfrm>
+          <a:prstGeom prst="rect">
+            <a:avLst/>
+          </a:prstGeom>
+          <a:noFill/>
+          <a:ln>
+            <a:noFill/>
+          </a:ln>
+        </p:spPr>
+        <p:style>
+          <a:lnRef idx="0"/>
+          <a:fillRef idx="0"/>
+          <a:effectRef idx="0"/>
+          <a:fontRef idx="minor"/>
+        </p:style>
+        <p:txBody>
+          <a:bodyPr lIns="0" rIns="0" tIns="0" bIns="0" anchor="ctr">
+            <a:noAutofit/>
+          </a:bodyPr>
+          <a:p>
+            <a:pPr>
+              <a:lnSpc>
+                <a:spcPct val="100000"/>
+              </a:lnSpc>
+            </a:pPr>
+            <a:r>
+              <a:rPr b="0" lang="de-DE" sz="2600" spc="-1" strike="noStrike">
+                <a:solidFill>
+                  <a:srgbClr val="17375e"/>
+                </a:solidFill>
+                <a:latin typeface="Calibri"/>
+                <a:ea typeface="DejaVu Sans"/>
+              </a:rPr>
+              <a:t>RangeShifter - </a:t>
+            </a:r>
+            <a:endParaRPr b="0" lang="en-GB" sz="2600" spc="-1" strike="noStrike">
+              <a:solidFill>
+                <a:srgbClr val="b2b2b2"/>
+              </a:solidFill>
+              <a:latin typeface="Arial"/>
+            </a:endParaRPr>
+          </a:p>
+        </p:txBody>
+      </p:sp>
+      <p:sp>
+        <p:nvSpPr>
+          <p:cNvPr id="102" name="CustomShape 3"/>
+          <p:cNvSpPr/>
+          <p:nvPr/>
+        </p:nvSpPr>
+        <p:spPr>
+          <a:xfrm>
+            <a:off x="2376000" y="207000"/>
+            <a:ext cx="4463280" cy="502200"/>
+          </a:xfrm>
+          <a:prstGeom prst="rect">
+            <a:avLst/>
+          </a:prstGeom>
+          <a:noFill/>
+          <a:ln>
+            <a:noFill/>
+          </a:ln>
+        </p:spPr>
+        <p:style>
+          <a:lnRef idx="0"/>
+          <a:fillRef idx="0"/>
+          <a:effectRef idx="0"/>
+          <a:fontRef idx="minor"/>
+        </p:style>
+        <p:txBody>
+          <a:bodyPr lIns="0" rIns="0" tIns="0" bIns="0" anchor="ctr">
+            <a:noAutofit/>
+          </a:bodyPr>
+          <a:p>
+            <a:pPr>
+              <a:lnSpc>
+                <a:spcPct val="100000"/>
+              </a:lnSpc>
+            </a:pPr>
+            <a:r>
+              <a:rPr b="0" lang="de-DE" sz="2000" spc="-1" strike="noStrike">
+                <a:solidFill>
+                  <a:srgbClr val="17375e"/>
+                </a:solidFill>
+                <a:latin typeface="Calibri"/>
+                <a:ea typeface="DejaVu Sans"/>
+              </a:rPr>
+              <a:t>An individual-based eco-evolutionary </a:t>
+            </a:r>
+            <a:endParaRPr b="0" lang="en-GB" sz="2000" spc="-1" strike="noStrike">
+              <a:solidFill>
+                <a:srgbClr val="b2b2b2"/>
+              </a:solidFill>
+              <a:latin typeface="Arial"/>
+            </a:endParaRPr>
+          </a:p>
+          <a:p>
+            <a:pPr>
+              <a:lnSpc>
+                <a:spcPct val="100000"/>
+              </a:lnSpc>
+            </a:pPr>
+            <a:r>
+              <a:rPr b="0" lang="de-DE" sz="2000" spc="-1" strike="noStrike">
+                <a:solidFill>
+                  <a:srgbClr val="17375e"/>
+                </a:solidFill>
+                <a:latin typeface="Calibri"/>
+                <a:ea typeface="DejaVu Sans"/>
+              </a:rPr>
+              <a:t>modelling platform</a:t>
+            </a:r>
+            <a:endParaRPr b="0" lang="en-GB" sz="2000" spc="-1" strike="noStrike">
+              <a:solidFill>
+                <a:srgbClr val="b2b2b2"/>
+              </a:solidFill>
+              <a:latin typeface="Arial"/>
+            </a:endParaRPr>
+          </a:p>
+        </p:txBody>
+      </p:sp>
     </p:spTree>
   </p:cSld>
   <mc:AlternateContent>
@@ -5877,7 +5676,7 @@
       </p:grpSpPr>
       <p:pic>
         <p:nvPicPr>
-          <p:cNvPr id="112" name="Grafik 11" descr=""/>
+          <p:cNvPr id="103" name="Grafik 11" descr=""/>
           <p:cNvPicPr/>
           <p:nvPr/>
         </p:nvPicPr>
@@ -5888,7 +5687,7 @@
         <p:spPr>
           <a:xfrm>
             <a:off x="166320" y="1866960"/>
-            <a:ext cx="1458000" cy="1488960"/>
+            <a:ext cx="1456920" cy="1487880"/>
           </a:xfrm>
           <a:prstGeom prst="rect">
             <a:avLst/>
@@ -5900,14 +5699,14 @@
       </p:pic>
       <p:sp>
         <p:nvSpPr>
-          <p:cNvPr id="113" name="CustomShape 1"/>
+          <p:cNvPr id="104" name="CustomShape 1"/>
           <p:cNvSpPr/>
           <p:nvPr/>
         </p:nvSpPr>
         <p:spPr>
           <a:xfrm>
             <a:off x="457200" y="207000"/>
-            <a:ext cx="8228520" cy="503280"/>
+            <a:ext cx="8227440" cy="502200"/>
           </a:xfrm>
           <a:prstGeom prst="rect">
             <a:avLst/>
@@ -5944,21 +5743,24 @@
               <a:t>R-package: RangeShiftR </a:t>
             </a:r>
             <a:endParaRPr b="0" lang="en-GB" sz="2800" spc="-1" strike="noStrike">
-              <a:latin typeface="Arial"/>
-            </a:endParaRPr>
-          </a:p>
-        </p:txBody>
-      </p:sp>
-      <p:sp>
-        <p:nvSpPr>
-          <p:cNvPr id="114" name="CustomShape 2"/>
+              <a:solidFill>
+                <a:srgbClr val="b2b2b2"/>
+              </a:solidFill>
+              <a:latin typeface="Arial"/>
+            </a:endParaRPr>
+          </a:p>
+        </p:txBody>
+      </p:sp>
+      <p:sp>
+        <p:nvSpPr>
+          <p:cNvPr id="105" name="CustomShape 2"/>
           <p:cNvSpPr/>
           <p:nvPr/>
         </p:nvSpPr>
         <p:spPr>
           <a:xfrm>
             <a:off x="93600" y="6386040"/>
-            <a:ext cx="6482160" cy="394200"/>
+            <a:ext cx="6481440" cy="394200"/>
           </a:xfrm>
           <a:prstGeom prst="rect">
             <a:avLst/>
@@ -5995,6 +5797,9 @@
               <a:t>Malchow et al. (2021) Ecography. DOI: 10.1111/ecog.05689 .</a:t>
             </a:r>
             <a:endParaRPr b="0" lang="en-GB" sz="1000" spc="-1" strike="noStrike">
+              <a:solidFill>
+                <a:srgbClr val="b2b2b2"/>
+              </a:solidFill>
               <a:latin typeface="Arial"/>
             </a:endParaRPr>
           </a:p>
@@ -6015,6 +5820,9 @@
               <a:t>Building on  Bocedi et al. (2014) Methods Ecol Evol 5: 388-396. &amp; Bocedi et al. (2021) Ecography. DOI: 10.1111/ecog.05687.</a:t>
             </a:r>
             <a:endParaRPr b="0" lang="en-GB" sz="1000" spc="-1" strike="noStrike">
+              <a:solidFill>
+                <a:srgbClr val="b2b2b2"/>
+              </a:solidFill>
               <a:latin typeface="Arial"/>
             </a:endParaRPr>
           </a:p>
@@ -6022,7 +5830,7 @@
       </p:sp>
       <p:pic>
         <p:nvPicPr>
-          <p:cNvPr id="115" name="Bild 14" descr=""/>
+          <p:cNvPr id="106" name="Bild 14" descr=""/>
           <p:cNvPicPr/>
           <p:nvPr/>
         </p:nvPicPr>
@@ -6033,7 +5841,7 @@
         <p:spPr>
           <a:xfrm>
             <a:off x="7632720" y="6217560"/>
-            <a:ext cx="1280160" cy="639360"/>
+            <a:ext cx="1279080" cy="638280"/>
           </a:xfrm>
           <a:prstGeom prst="rect">
             <a:avLst/>
@@ -6045,7 +5853,7 @@
       </p:pic>
       <p:pic>
         <p:nvPicPr>
-          <p:cNvPr id="116" name="Picture 2" descr=""/>
+          <p:cNvPr id="107" name="Picture 2" descr=""/>
           <p:cNvPicPr/>
           <p:nvPr/>
         </p:nvPicPr>
@@ -6056,7 +5864,7 @@
         <p:spPr>
           <a:xfrm>
             <a:off x="1903320" y="1155600"/>
-            <a:ext cx="6230160" cy="5060520"/>
+            <a:ext cx="6229080" cy="5059440"/>
           </a:xfrm>
           <a:prstGeom prst="rect">
             <a:avLst/>
@@ -6098,14 +5906,14 @@
       </p:grpSpPr>
       <p:sp>
         <p:nvSpPr>
-          <p:cNvPr id="117" name="CustomShape 1"/>
+          <p:cNvPr id="108" name="CustomShape 1"/>
           <p:cNvSpPr/>
           <p:nvPr/>
         </p:nvSpPr>
         <p:spPr>
           <a:xfrm>
             <a:off x="457200" y="207000"/>
-            <a:ext cx="8228520" cy="503280"/>
+            <a:ext cx="8227440" cy="502200"/>
           </a:xfrm>
           <a:prstGeom prst="rect">
             <a:avLst/>
@@ -6142,21 +5950,24 @@
               <a:t>Practical 1: Getting started with RangeShiftR</a:t>
             </a:r>
             <a:endParaRPr b="0" lang="en-GB" sz="2200" spc="-1" strike="noStrike">
-              <a:latin typeface="Arial"/>
-            </a:endParaRPr>
-          </a:p>
-        </p:txBody>
-      </p:sp>
-      <p:sp>
-        <p:nvSpPr>
-          <p:cNvPr id="118" name="CustomShape 2"/>
+              <a:solidFill>
+                <a:srgbClr val="b2b2b2"/>
+              </a:solidFill>
+              <a:latin typeface="Arial"/>
+            </a:endParaRPr>
+          </a:p>
+        </p:txBody>
+      </p:sp>
+      <p:sp>
+        <p:nvSpPr>
+          <p:cNvPr id="109" name="CustomShape 2"/>
           <p:cNvSpPr/>
           <p:nvPr/>
         </p:nvSpPr>
         <p:spPr>
           <a:xfrm>
             <a:off x="540000" y="1416240"/>
-            <a:ext cx="8228520" cy="1823040"/>
+            <a:ext cx="8227440" cy="1821960"/>
           </a:xfrm>
           <a:prstGeom prst="rect">
             <a:avLst/>
@@ -6177,7 +5988,7 @@
             <a:noAutofit/>
           </a:bodyPr>
           <a:p>
-            <a:pPr marL="343080" indent="-342000">
+            <a:pPr marL="343080" indent="-340920">
               <a:lnSpc>
                 <a:spcPct val="100000"/>
               </a:lnSpc>
@@ -6201,11 +6012,14 @@
               <a:t>Break-out rooms of 4-5 participants per group</a:t>
             </a:r>
             <a:endParaRPr b="0" lang="en-GB" sz="1800" spc="-1" strike="noStrike">
-              <a:latin typeface="Arial"/>
-            </a:endParaRPr>
-          </a:p>
-          <a:p>
-            <a:pPr marL="343080" indent="-342000">
+              <a:solidFill>
+                <a:srgbClr val="b2b2b2"/>
+              </a:solidFill>
+              <a:latin typeface="Arial"/>
+            </a:endParaRPr>
+          </a:p>
+          <a:p>
+            <a:pPr marL="343080" indent="-340920">
               <a:lnSpc>
                 <a:spcPct val="100000"/>
               </a:lnSpc>
@@ -6229,11 +6043,14 @@
               <a:t>Time: 15 mins</a:t>
             </a:r>
             <a:endParaRPr b="0" lang="en-GB" sz="1800" spc="-1" strike="noStrike">
-              <a:latin typeface="Arial"/>
-            </a:endParaRPr>
-          </a:p>
-          <a:p>
-            <a:pPr marL="343080" indent="-342000">
+              <a:solidFill>
+                <a:srgbClr val="b2b2b2"/>
+              </a:solidFill>
+              <a:latin typeface="Arial"/>
+            </a:endParaRPr>
+          </a:p>
+          <a:p>
+            <a:pPr marL="343080" indent="-340920">
               <a:lnSpc>
                 <a:spcPct val="100000"/>
               </a:lnSpc>
@@ -6257,11 +6074,14 @@
               <a:t>Script:  </a:t>
             </a:r>
             <a:endParaRPr b="0" lang="en-GB" sz="1800" spc="-1" strike="noStrike">
-              <a:latin typeface="Arial"/>
-            </a:endParaRPr>
-          </a:p>
-          <a:p>
-            <a:pPr lvl="1" marL="864000" indent="-323280">
+              <a:solidFill>
+                <a:srgbClr val="b2b2b2"/>
+              </a:solidFill>
+              <a:latin typeface="Arial"/>
+            </a:endParaRPr>
+          </a:p>
+          <a:p>
+            <a:pPr lvl="1" marL="864000" indent="-322200">
               <a:lnSpc>
                 <a:spcPct val="100000"/>
               </a:lnSpc>
@@ -6286,6 +6106,9 @@
               <a:t>IBS2022_RS_workshop/code/Prac1_RangeShiftR_GettingStarted.R </a:t>
             </a:r>
             <a:endParaRPr b="0" lang="en-GB" sz="1800" spc="-1" strike="noStrike">
+              <a:solidFill>
+                <a:srgbClr val="b2b2b2"/>
+              </a:solidFill>
               <a:latin typeface="Arial"/>
             </a:endParaRPr>
           </a:p>
@@ -6299,6 +6122,9 @@
               </a:spcBef>
             </a:pPr>
             <a:endParaRPr b="0" lang="en-GB" sz="1800" spc="-1" strike="noStrike">
+              <a:solidFill>
+                <a:srgbClr val="b2b2b2"/>
+              </a:solidFill>
               <a:latin typeface="Arial"/>
             </a:endParaRPr>
           </a:p>
@@ -6306,7 +6132,7 @@
       </p:sp>
       <p:pic>
         <p:nvPicPr>
-          <p:cNvPr id="119" name="" descr=""/>
+          <p:cNvPr id="110" name="" descr=""/>
           <p:cNvPicPr/>
           <p:nvPr/>
         </p:nvPicPr>
@@ -6317,7 +6143,7 @@
         <p:spPr>
           <a:xfrm>
             <a:off x="5256000" y="3003840"/>
-            <a:ext cx="3286080" cy="3421080"/>
+            <a:ext cx="3285000" cy="3420000"/>
           </a:xfrm>
           <a:prstGeom prst="rect">
             <a:avLst/>
@@ -6329,7 +6155,7 @@
       </p:pic>
       <p:pic>
         <p:nvPicPr>
-          <p:cNvPr id="120" name="" descr=""/>
+          <p:cNvPr id="111" name="" descr=""/>
           <p:cNvPicPr/>
           <p:nvPr/>
         </p:nvPicPr>
@@ -6340,7 +6166,7 @@
         <p:spPr>
           <a:xfrm>
             <a:off x="792000" y="3060000"/>
-            <a:ext cx="4447080" cy="3131280"/>
+            <a:ext cx="4446000" cy="3130200"/>
           </a:xfrm>
           <a:prstGeom prst="rect">
             <a:avLst/>
@@ -6382,14 +6208,14 @@
       </p:grpSpPr>
       <p:sp>
         <p:nvSpPr>
-          <p:cNvPr id="121" name="CustomShape 1"/>
+          <p:cNvPr id="112" name="CustomShape 1"/>
           <p:cNvSpPr/>
           <p:nvPr/>
         </p:nvSpPr>
         <p:spPr>
           <a:xfrm>
             <a:off x="2887560" y="3177000"/>
-            <a:ext cx="3368520" cy="503280"/>
+            <a:ext cx="3367440" cy="502200"/>
           </a:xfrm>
           <a:prstGeom prst="rect">
             <a:avLst/>
@@ -6426,409 +6252,14 @@
               <a:t>Break: 15 mins</a:t>
             </a:r>
             <a:endParaRPr b="0" lang="en-GB" sz="2600" spc="-1" strike="noStrike">
-              <a:latin typeface="Arial"/>
-            </a:endParaRPr>
-          </a:p>
-        </p:txBody>
-      </p:sp>
-    </p:spTree>
-  </p:cSld>
-  <mc:AlternateContent>
-    <mc:Choice Requires="p14">
-      <p:transition spd="slow" p14:dur="2000"/>
-    </mc:Choice>
-    <mc:Fallback>
-      <p:transition spd="slow"/>
-    </mc:Fallback>
-  </mc:AlternateContent>
-</p:sld>
-</file>
-
-<file path=ppt/slides/slide7.xml><?xml version="1.0" encoding="utf-8"?>
-<p:sld xmlns:a="http://schemas.openxmlformats.org/drawingml/2006/main" xmlns:p="http://schemas.openxmlformats.org/presentationml/2006/main" xmlns:r="http://schemas.openxmlformats.org/officeDocument/2006/relationships" xmlns:p14="http://schemas.microsoft.com/office/powerpoint/2010/main" xmlns:p15="http://schemas.microsoft.com/office/powerpoint/2012/main" xmlns:mc="http://schemas.openxmlformats.org/markup-compatibility/2006" show="0">
-  <p:cSld>
-    <p:spTree>
-      <p:nvGrpSpPr>
-        <p:cNvPr id="1" name=""/>
-        <p:cNvGrpSpPr/>
-        <p:nvPr/>
-      </p:nvGrpSpPr>
-      <p:grpSpPr>
-        <a:xfrm>
-          <a:off x="0" y="0"/>
-          <a:ext cx="0" cy="0"/>
-          <a:chOff x="0" y="0"/>
-          <a:chExt cx="0" cy="0"/>
-        </a:xfrm>
-      </p:grpSpPr>
-      <p:sp>
-        <p:nvSpPr>
-          <p:cNvPr id="122" name="CustomShape 1"/>
-          <p:cNvSpPr/>
-          <p:nvPr/>
-        </p:nvSpPr>
-        <p:spPr>
-          <a:xfrm>
-            <a:off x="457200" y="207000"/>
-            <a:ext cx="8228520" cy="503280"/>
-          </a:xfrm>
-          <a:prstGeom prst="rect">
-            <a:avLst/>
-          </a:prstGeom>
-          <a:noFill/>
-          <a:ln>
-            <a:noFill/>
-          </a:ln>
-        </p:spPr>
-        <p:style>
-          <a:lnRef idx="0"/>
-          <a:fillRef idx="0"/>
-          <a:effectRef idx="0"/>
-          <a:fontRef idx="minor"/>
-        </p:style>
-        <p:txBody>
-          <a:bodyPr lIns="0" rIns="0" tIns="0" bIns="0" anchor="ctr">
-            <a:noAutofit/>
-          </a:bodyPr>
-          <a:p>
-            <a:pPr>
-              <a:lnSpc>
-                <a:spcPct val="100000"/>
-              </a:lnSpc>
-            </a:pPr>
-            <a:r>
-              <a:rPr b="0" lang="de-DE" sz="3200" spc="-1" strike="noStrike">
-                <a:solidFill>
-                  <a:srgbClr val="17375e"/>
-                </a:solidFill>
-                <a:latin typeface="Calibri"/>
-                <a:ea typeface="DejaVu Sans"/>
-              </a:rPr>
-              <a:t>Thank you for your interest</a:t>
-            </a:r>
-            <a:endParaRPr b="0" lang="en-GB" sz="3200" spc="-1" strike="noStrike">
-              <a:latin typeface="Arial"/>
-            </a:endParaRPr>
-          </a:p>
-        </p:txBody>
-      </p:sp>
-      <p:sp>
-        <p:nvSpPr>
-          <p:cNvPr id="123" name="CustomShape 2"/>
-          <p:cNvSpPr/>
-          <p:nvPr/>
-        </p:nvSpPr>
-        <p:spPr>
-          <a:xfrm>
-            <a:off x="239040" y="3750480"/>
-            <a:ext cx="4643640" cy="2994480"/>
-          </a:xfrm>
-          <a:prstGeom prst="rect">
-            <a:avLst/>
-          </a:prstGeom>
-          <a:noFill/>
-          <a:ln>
-            <a:noFill/>
-          </a:ln>
-        </p:spPr>
-        <p:style>
-          <a:lnRef idx="0"/>
-          <a:fillRef idx="0"/>
-          <a:effectRef idx="0"/>
-          <a:fontRef idx="minor"/>
-        </p:style>
-        <p:txBody>
-          <a:bodyPr lIns="90000" rIns="90000" tIns="45000" bIns="45000">
-            <a:noAutofit/>
-          </a:bodyPr>
-          <a:p>
-            <a:pPr>
-              <a:lnSpc>
-                <a:spcPct val="100000"/>
-              </a:lnSpc>
-              <a:spcBef>
-                <a:spcPts val="400"/>
-              </a:spcBef>
-              <a:tabLst>
-                <a:tab algn="l" pos="0"/>
-              </a:tabLst>
-            </a:pPr>
-            <a:r>
-              <a:rPr b="1" lang="de-DE" sz="2000" spc="-1" strike="noStrike">
-                <a:solidFill>
-                  <a:srgbClr val="00376c"/>
-                </a:solidFill>
-                <a:latin typeface="Calibri"/>
-                <a:ea typeface="DejaVu Sans"/>
-              </a:rPr>
-              <a:t>Contact:</a:t>
-            </a:r>
-            <a:endParaRPr b="0" lang="en-GB" sz="2000" spc="-1" strike="noStrike">
-              <a:latin typeface="Arial"/>
-            </a:endParaRPr>
-          </a:p>
-          <a:p>
-            <a:pPr>
-              <a:lnSpc>
-                <a:spcPct val="100000"/>
-              </a:lnSpc>
-              <a:spcBef>
-                <a:spcPts val="400"/>
-              </a:spcBef>
-              <a:tabLst>
-                <a:tab algn="l" pos="0"/>
-              </a:tabLst>
-            </a:pPr>
-            <a:r>
-              <a:rPr b="1" lang="de-DE" sz="2000" spc="-1" strike="noStrike">
-                <a:solidFill>
-                  <a:srgbClr val="00376c"/>
-                </a:solidFill>
-                <a:latin typeface="Calibri"/>
-                <a:ea typeface="DejaVu Sans"/>
-              </a:rPr>
-              <a:t>Damaris Zurell</a:t>
-            </a:r>
-            <a:endParaRPr b="0" lang="en-GB" sz="2000" spc="-1" strike="noStrike">
-              <a:latin typeface="Arial"/>
-            </a:endParaRPr>
-          </a:p>
-          <a:p>
-            <a:pPr>
-              <a:lnSpc>
-                <a:spcPct val="100000"/>
-              </a:lnSpc>
-              <a:spcBef>
-                <a:spcPts val="400"/>
-              </a:spcBef>
-              <a:tabLst>
-                <a:tab algn="l" pos="0"/>
-              </a:tabLst>
-            </a:pPr>
-            <a:r>
-              <a:rPr b="0" lang="de-DE" sz="2000" spc="-1" strike="noStrike">
-                <a:solidFill>
-                  <a:srgbClr val="00376c"/>
-                </a:solidFill>
-                <a:latin typeface="Calibri"/>
-                <a:ea typeface="DejaVu Sans"/>
-              </a:rPr>
-              <a:t>Ecology &amp; Macroecology</a:t>
-            </a:r>
-            <a:endParaRPr b="0" lang="en-GB" sz="2000" spc="-1" strike="noStrike">
-              <a:latin typeface="Arial"/>
-            </a:endParaRPr>
-          </a:p>
-          <a:p>
-            <a:pPr>
-              <a:lnSpc>
-                <a:spcPct val="100000"/>
-              </a:lnSpc>
-              <a:spcBef>
-                <a:spcPts val="400"/>
-              </a:spcBef>
-              <a:tabLst>
-                <a:tab algn="l" pos="0"/>
-              </a:tabLst>
-            </a:pPr>
-            <a:r>
-              <a:rPr b="0" lang="de-DE" sz="2000" spc="-1" strike="noStrike">
-                <a:solidFill>
-                  <a:srgbClr val="00376c"/>
-                </a:solidFill>
-                <a:latin typeface="Calibri"/>
-                <a:ea typeface="DejaVu Sans"/>
-              </a:rPr>
-              <a:t>University of Potsdam</a:t>
-            </a:r>
-            <a:endParaRPr b="0" lang="en-GB" sz="2000" spc="-1" strike="noStrike">
-              <a:latin typeface="Arial"/>
-            </a:endParaRPr>
-          </a:p>
-          <a:p>
-            <a:pPr>
-              <a:lnSpc>
-                <a:spcPct val="100000"/>
-              </a:lnSpc>
-              <a:spcBef>
-                <a:spcPts val="400"/>
-              </a:spcBef>
-              <a:tabLst>
-                <a:tab algn="l" pos="0"/>
-              </a:tabLst>
-            </a:pPr>
-            <a:endParaRPr b="0" lang="en-GB" sz="2000" spc="-1" strike="noStrike">
-              <a:latin typeface="Arial"/>
-            </a:endParaRPr>
-          </a:p>
-          <a:p>
-            <a:pPr>
-              <a:lnSpc>
-                <a:spcPct val="100000"/>
-              </a:lnSpc>
-              <a:spcBef>
-                <a:spcPts val="400"/>
-              </a:spcBef>
-              <a:tabLst>
-                <a:tab algn="l" pos="0"/>
-              </a:tabLst>
-            </a:pPr>
-            <a:r>
-              <a:rPr b="0" lang="de-DE" sz="2000" spc="-1" strike="noStrike">
-                <a:solidFill>
-                  <a:srgbClr val="00376c"/>
-                </a:solidFill>
-                <a:latin typeface="Calibri"/>
-                <a:ea typeface="DejaVu Sans"/>
-              </a:rPr>
-              <a:t>https://damariszurell.github.io</a:t>
-            </a:r>
-            <a:endParaRPr b="0" lang="en-GB" sz="2000" spc="-1" strike="noStrike">
-              <a:latin typeface="Arial"/>
-            </a:endParaRPr>
-          </a:p>
-          <a:p>
-            <a:pPr>
-              <a:lnSpc>
-                <a:spcPct val="100000"/>
-              </a:lnSpc>
-              <a:spcBef>
-                <a:spcPts val="400"/>
-              </a:spcBef>
-              <a:tabLst>
-                <a:tab algn="l" pos="0"/>
-              </a:tabLst>
-            </a:pPr>
-            <a:r>
-              <a:rPr b="0" lang="de-DE" sz="2000" spc="-1" strike="noStrike">
-                <a:solidFill>
-                  <a:srgbClr val="00376c"/>
-                </a:solidFill>
-                <a:latin typeface="Calibri"/>
-                <a:ea typeface="DejaVu Sans"/>
-              </a:rPr>
-              <a:t>Email: damaris.zurell@uni-potsdam.de</a:t>
-            </a:r>
-            <a:endParaRPr b="0" lang="en-GB" sz="2000" spc="-1" strike="noStrike">
-              <a:latin typeface="Arial"/>
-            </a:endParaRPr>
-          </a:p>
-          <a:p>
-            <a:pPr>
-              <a:lnSpc>
-                <a:spcPct val="100000"/>
-              </a:lnSpc>
-              <a:spcBef>
-                <a:spcPts val="400"/>
-              </a:spcBef>
-              <a:tabLst>
-                <a:tab algn="l" pos="0"/>
-              </a:tabLst>
-            </a:pPr>
-            <a:r>
-              <a:rPr b="0" lang="de-DE" sz="2000" spc="-1" strike="noStrike">
-                <a:solidFill>
-                  <a:srgbClr val="00376c"/>
-                </a:solidFill>
-                <a:latin typeface="Calibri"/>
-                <a:ea typeface="DejaVu Sans"/>
-              </a:rPr>
-              <a:t>	</a:t>
-            </a:r>
-            <a:r>
-              <a:rPr b="0" lang="de-DE" sz="2000" spc="-1" strike="noStrike">
-                <a:solidFill>
-                  <a:srgbClr val="00376c"/>
-                </a:solidFill>
-                <a:latin typeface="Calibri"/>
-                <a:ea typeface="DejaVu Sans"/>
-              </a:rPr>
-              <a:t>@ZurellLab</a:t>
-            </a:r>
-            <a:endParaRPr b="0" lang="en-GB" sz="2000" spc="-1" strike="noStrike">
-              <a:latin typeface="Arial"/>
-            </a:endParaRPr>
-          </a:p>
-          <a:p>
-            <a:pPr>
-              <a:lnSpc>
-                <a:spcPct val="100000"/>
-              </a:lnSpc>
-              <a:spcBef>
-                <a:spcPts val="400"/>
-              </a:spcBef>
-              <a:tabLst>
-                <a:tab algn="l" pos="0"/>
-              </a:tabLst>
-            </a:pPr>
-            <a:endParaRPr b="0" lang="en-GB" sz="2000" spc="-1" strike="noStrike">
-              <a:latin typeface="Arial"/>
-            </a:endParaRPr>
-          </a:p>
-          <a:p>
-            <a:pPr>
-              <a:lnSpc>
-                <a:spcPct val="100000"/>
-              </a:lnSpc>
-              <a:spcBef>
-                <a:spcPts val="400"/>
-              </a:spcBef>
-              <a:tabLst>
-                <a:tab algn="l" pos="0"/>
-              </a:tabLst>
-            </a:pPr>
-            <a:endParaRPr b="0" lang="en-GB" sz="2000" spc="-1" strike="noStrike">
-              <a:latin typeface="Arial"/>
-            </a:endParaRPr>
-          </a:p>
-        </p:txBody>
-      </p:sp>
-      <p:pic>
-        <p:nvPicPr>
-          <p:cNvPr id="124" name="Bild 9" descr=""/>
-          <p:cNvPicPr/>
-          <p:nvPr/>
-        </p:nvPicPr>
-        <p:blipFill>
-          <a:blip r:embed="rId1"/>
-          <a:stretch/>
-        </p:blipFill>
-        <p:spPr>
-          <a:xfrm>
-            <a:off x="348840" y="6333120"/>
-            <a:ext cx="389880" cy="316080"/>
-          </a:xfrm>
-          <a:prstGeom prst="rect">
-            <a:avLst/>
-          </a:prstGeom>
-          <a:ln>
-            <a:noFill/>
-          </a:ln>
-        </p:spPr>
-      </p:pic>
-      <p:pic>
-        <p:nvPicPr>
-          <p:cNvPr id="125" name="Picture 2" descr="BIOPIC"/>
-          <p:cNvPicPr/>
-          <p:nvPr/>
-        </p:nvPicPr>
-        <p:blipFill>
-          <a:blip r:embed="rId2"/>
-          <a:stretch/>
-        </p:blipFill>
-        <p:spPr>
-          <a:xfrm>
-            <a:off x="3929040" y="2072160"/>
-            <a:ext cx="4756680" cy="3355200"/>
-          </a:xfrm>
-          <a:prstGeom prst="rect">
-            <a:avLst/>
-          </a:prstGeom>
-          <a:ln>
-            <a:noFill/>
-          </a:ln>
-        </p:spPr>
-      </p:pic>
+              <a:solidFill>
+                <a:srgbClr val="b2b2b2"/>
+              </a:solidFill>
+              <a:latin typeface="Arial"/>
+            </a:endParaRPr>
+          </a:p>
+        </p:txBody>
+      </p:sp>
     </p:spTree>
   </p:cSld>
   <mc:AlternateContent>

</xml_diff>